<commit_message>
Update 11  Gen AI - Synthetic data generation.pptx
</commit_message>
<xml_diff>
--- a/slides/LLMs/11  Gen AI - Synthetic data generation.pptx
+++ b/slides/LLMs/11  Gen AI - Synthetic data generation.pptx
@@ -5,10 +5,10 @@
     <p:sldMasterId id="2147483648" r:id="rId1"/>
   </p:sldMasterIdLst>
   <p:notesMasterIdLst>
-    <p:notesMasterId r:id="rId29"/>
+    <p:notesMasterId r:id="rId28"/>
   </p:notesMasterIdLst>
   <p:handoutMasterIdLst>
-    <p:handoutMasterId r:id="rId30"/>
+    <p:handoutMasterId r:id="rId29"/>
   </p:handoutMasterIdLst>
   <p:sldIdLst>
     <p:sldId id="256" r:id="rId3"/>
@@ -16,27 +16,26 @@
     <p:sldId id="1480" r:id="rId5"/>
     <p:sldId id="1481" r:id="rId6"/>
     <p:sldId id="1482" r:id="rId7"/>
-    <p:sldId id="1483" r:id="rId8"/>
-    <p:sldId id="1484" r:id="rId9"/>
-    <p:sldId id="1486" r:id="rId10"/>
-    <p:sldId id="1485" r:id="rId11"/>
-    <p:sldId id="1487" r:id="rId12"/>
-    <p:sldId id="1490" r:id="rId13"/>
-    <p:sldId id="1489" r:id="rId14"/>
-    <p:sldId id="1494" r:id="rId15"/>
-    <p:sldId id="1491" r:id="rId16"/>
-    <p:sldId id="1492" r:id="rId17"/>
-    <p:sldId id="1493" r:id="rId18"/>
-    <p:sldId id="1495" r:id="rId19"/>
-    <p:sldId id="1507" r:id="rId20"/>
-    <p:sldId id="1498" r:id="rId21"/>
-    <p:sldId id="1499" r:id="rId22"/>
-    <p:sldId id="1500" r:id="rId23"/>
-    <p:sldId id="1501" r:id="rId24"/>
-    <p:sldId id="1502" r:id="rId25"/>
-    <p:sldId id="1503" r:id="rId26"/>
-    <p:sldId id="1488" r:id="rId27"/>
-    <p:sldId id="1315" r:id="rId28"/>
+    <p:sldId id="1484" r:id="rId8"/>
+    <p:sldId id="1486" r:id="rId9"/>
+    <p:sldId id="1485" r:id="rId10"/>
+    <p:sldId id="1487" r:id="rId11"/>
+    <p:sldId id="1490" r:id="rId12"/>
+    <p:sldId id="1489" r:id="rId13"/>
+    <p:sldId id="1494" r:id="rId14"/>
+    <p:sldId id="1491" r:id="rId15"/>
+    <p:sldId id="1492" r:id="rId16"/>
+    <p:sldId id="1493" r:id="rId17"/>
+    <p:sldId id="1495" r:id="rId18"/>
+    <p:sldId id="1507" r:id="rId19"/>
+    <p:sldId id="1498" r:id="rId20"/>
+    <p:sldId id="1499" r:id="rId21"/>
+    <p:sldId id="1500" r:id="rId22"/>
+    <p:sldId id="1501" r:id="rId23"/>
+    <p:sldId id="1502" r:id="rId24"/>
+    <p:sldId id="1503" r:id="rId25"/>
+    <p:sldId id="1488" r:id="rId26"/>
+    <p:sldId id="1315" r:id="rId27"/>
   </p:sldIdLst>
   <p:sldSz cx="12192000" cy="6858000"/>
   <p:notesSz cx="6858000" cy="9144000"/>
@@ -7407,132 +7406,6 @@
         </p:nvSpPr>
         <p:spPr/>
         <p:txBody>
-          <a:bodyPr/>
-          <a:p>
-            <a:r>
-              <a:rPr lang="en-US"/>
-              <a:t>“Synthetic Data Cheat Sheet”</a:t>
-            </a:r>
-            <a:endParaRPr lang="en-US"/>
-          </a:p>
-        </p:txBody>
-      </p:sp>
-      <p:sp>
-        <p:nvSpPr>
-          <p:cNvPr id="3" name="Content Placeholder 2"/>
-          <p:cNvSpPr>
-            <a:spLocks noGrp="1"/>
-          </p:cNvSpPr>
-          <p:nvPr>
-            <p:ph idx="1"/>
-          </p:nvPr>
-        </p:nvSpPr>
-        <p:spPr/>
-        <p:txBody>
-          <a:bodyPr>
-            <a:normAutofit fontScale="80000"/>
-          </a:bodyPr>
-          <a:p>
-            <a:r>
-              <a:rPr lang="en-US"/>
-              <a:t>Generative Adversarial Networks (GANs):</a:t>
-            </a:r>
-            <a:endParaRPr lang="en-US"/>
-          </a:p>
-          <a:p>
-            <a:pPr lvl="1"/>
-            <a:r>
-              <a:rPr lang="en-US"/>
-              <a:t>Goal: Ultra-realistic visuals (e.g., medical images, fashion products, chatbot faces).</a:t>
-            </a:r>
-            <a:endParaRPr lang="en-US"/>
-          </a:p>
-          <a:p>
-            <a:pPr lvl="1"/>
-            <a:r>
-              <a:rPr lang="en-US"/>
-              <a:t>Real-World Case: Researchers used GANs for synthetic brain scans, aiding disease detection while protecting privacy.</a:t>
-            </a:r>
-            <a:endParaRPr lang="en-US"/>
-          </a:p>
-          <a:p>
-            <a:r>
-              <a:rPr lang="en-US"/>
-              <a:t>Procedural Generation:</a:t>
-            </a:r>
-            <a:endParaRPr lang="en-US"/>
-          </a:p>
-          <a:p>
-            <a:pPr lvl="1"/>
-            <a:r>
-              <a:rPr lang="en-US"/>
-              <a:t>Goal: Large sets of structured data (customer records, financial transactions, website logs).</a:t>
-            </a:r>
-            <a:endParaRPr lang="en-US"/>
-          </a:p>
-          <a:p>
-            <a:pPr lvl="1"/>
-            <a:r>
-              <a:rPr lang="en-US"/>
-              <a:t>Real-World Case: E-commerce companies test website layout changes using procedural generation.</a:t>
-            </a:r>
-            <a:endParaRPr lang="en-US"/>
-          </a:p>
-          <a:p>
-            <a:r>
-              <a:rPr lang="en-US"/>
-              <a:t>Simulation-Based:</a:t>
-            </a:r>
-            <a:endParaRPr lang="en-US"/>
-          </a:p>
-          <a:p>
-            <a:pPr lvl="1"/>
-            <a:r>
-              <a:rPr lang="en-US"/>
-              <a:t>Goal: AI that reacts to a physics-based world (robotics, self-driving cars, game development).</a:t>
-            </a:r>
-            <a:endParaRPr lang="en-US"/>
-          </a:p>
-          <a:p>
-            <a:pPr lvl="1"/>
-            <a:r>
-              <a:rPr lang="en-US"/>
-              <a:t>Real-World Case: Self-driving car companies train AI in hyper-realistic simulations.</a:t>
-            </a:r>
-            <a:endParaRPr lang="en-US"/>
-          </a:p>
-        </p:txBody>
-      </p:sp>
-    </p:spTree>
-  </p:cSld>
-  <p:clrMapOvr>
-    <a:masterClrMapping/>
-  </p:clrMapOvr>
-</p:sld>
-</file>
-
-<file path=ppt/slides/slide11.xml><?xml version="1.0" encoding="utf-8"?>
-<p:sld xmlns:a="http://schemas.openxmlformats.org/drawingml/2006/main" xmlns:r="http://schemas.openxmlformats.org/officeDocument/2006/relationships" xmlns:p="http://schemas.openxmlformats.org/presentationml/2006/main">
-  <p:cSld>
-    <p:spTree>
-      <p:nvGrpSpPr>
-        <p:cNvPr id="1" name=""/>
-        <p:cNvGrpSpPr/>
-        <p:nvPr/>
-      </p:nvGrpSpPr>
-      <p:grpSpPr/>
-      <p:sp>
-        <p:nvSpPr>
-          <p:cNvPr id="2" name="Title 1"/>
-          <p:cNvSpPr>
-            <a:spLocks noGrp="1"/>
-          </p:cNvSpPr>
-          <p:nvPr>
-            <p:ph type="title"/>
-          </p:nvPr>
-        </p:nvSpPr>
-        <p:spPr/>
-        <p:txBody>
           <a:bodyPr>
             <a:normAutofit fontScale="90000"/>
           </a:bodyPr>
@@ -7571,6 +7444,114 @@
 </p:sld>
 </file>
 
+<file path=ppt/slides/slide11.xml><?xml version="1.0" encoding="utf-8"?>
+<p:sld xmlns:a="http://schemas.openxmlformats.org/drawingml/2006/main" xmlns:r="http://schemas.openxmlformats.org/officeDocument/2006/relationships" xmlns:p="http://schemas.openxmlformats.org/presentationml/2006/main">
+  <p:cSld>
+    <p:spTree>
+      <p:nvGrpSpPr>
+        <p:cNvPr id="1" name=""/>
+        <p:cNvGrpSpPr/>
+        <p:nvPr/>
+      </p:nvGrpSpPr>
+      <p:grpSpPr/>
+      <p:sp>
+        <p:nvSpPr>
+          <p:cNvPr id="2" name="Title 1"/>
+          <p:cNvSpPr>
+            <a:spLocks noGrp="1"/>
+          </p:cNvSpPr>
+          <p:nvPr>
+            <p:ph type="title"/>
+          </p:nvPr>
+        </p:nvSpPr>
+        <p:spPr/>
+        <p:txBody>
+          <a:bodyPr>
+            <a:normAutofit fontScale="90000"/>
+          </a:bodyPr>
+          <a:p>
+            <a:r>
+              <a:rPr lang="en-US"/>
+              <a:t>Generating data using Large Language Models (LLMs)</a:t>
+            </a:r>
+            <a:endParaRPr lang="en-US"/>
+          </a:p>
+        </p:txBody>
+      </p:sp>
+      <p:sp>
+        <p:nvSpPr>
+          <p:cNvPr id="3" name="Content Placeholder 2"/>
+          <p:cNvSpPr>
+            <a:spLocks noGrp="1"/>
+          </p:cNvSpPr>
+          <p:nvPr>
+            <p:ph idx="1"/>
+          </p:nvPr>
+        </p:nvSpPr>
+        <p:spPr/>
+        <p:txBody>
+          <a:bodyPr>
+            <a:normAutofit fontScale="55000"/>
+          </a:bodyPr>
+          <a:p>
+            <a:r>
+              <a:rPr lang="en-US"/>
+              <a:t>Choose an LLM: Select a suitable LLM, such as OpenAI's GPT-4, which is powerful and versatile for generating various types of data.</a:t>
+            </a:r>
+            <a:endParaRPr lang="en-US"/>
+          </a:p>
+          <a:p>
+            <a:r>
+              <a:rPr lang="en-US"/>
+              <a:t>Set Up the Environment: Ensure you have access to the chosen LLM. This may involve using an API provided by the model's creators (e.g., OpenAI API for GPT-4).</a:t>
+            </a:r>
+            <a:endParaRPr lang="en-US"/>
+          </a:p>
+          <a:p>
+            <a:r>
+              <a:rPr lang="en-US"/>
+              <a:t>Define the Data Requirements: Clearly outline what type of data you need. This could be structured (like tables) or unstructured (like text paragraphs).</a:t>
+            </a:r>
+            <a:endParaRPr lang="en-US"/>
+          </a:p>
+          <a:p>
+            <a:r>
+              <a:rPr lang="en-US"/>
+              <a:t>Create Prompts: Design prompts that guide the LLM to generate the desired data. Prompts should be specific and detailed to get accurate outputs. For example, if you need customer reviews, a prompt might be: "Generate a positive customer review for a smartphone."</a:t>
+            </a:r>
+            <a:endParaRPr lang="en-US"/>
+          </a:p>
+          <a:p>
+            <a:r>
+              <a:rPr lang="en-US"/>
+              <a:t>Generate Data: Use the prompts to generate data. You can automate this process by writing scripts that call the LLM's API and store the generated data.</a:t>
+            </a:r>
+            <a:endParaRPr lang="en-US"/>
+          </a:p>
+          <a:p>
+            <a:r>
+              <a:rPr lang="en-US"/>
+              <a:t>Review and Refine: Evaluate the generated data for quality and relevance. Refine your prompts or adjust the model parameters (like temperature and max tokens) to improve the outputs.</a:t>
+            </a:r>
+            <a:endParaRPr lang="en-US"/>
+          </a:p>
+          <a:p>
+            <a:r>
+              <a:rPr lang="en-US"/>
+              <a:t>Post-Processing: Process the generated data as needed. This might include cleaning, structuring, or formatting the data to meet your specific requirements.</a:t>
+            </a:r>
+            <a:endParaRPr lang="en-US"/>
+          </a:p>
+        </p:txBody>
+      </p:sp>
+    </p:spTree>
+  </p:cSld>
+  <p:clrMapOvr>
+    <a:masterClrMapping/>
+  </p:clrMapOvr>
+</p:sld>
+</file>
+
 <file path=ppt/slides/slide12.xml><?xml version="1.0" encoding="utf-8"?>
 <p:sld xmlns:a="http://schemas.openxmlformats.org/drawingml/2006/main" xmlns:r="http://schemas.openxmlformats.org/officeDocument/2006/relationships" xmlns:p="http://schemas.openxmlformats.org/presentationml/2006/main">
   <p:cSld>
@@ -7591,7 +7572,12 @@
             <p:ph type="title"/>
           </p:nvPr>
         </p:nvSpPr>
-        <p:spPr/>
+        <p:spPr>
+          <a:xfrm>
+            <a:off x="643255" y="1787525"/>
+            <a:ext cx="4547870" cy="2459990"/>
+          </a:xfrm>
+        </p:spPr>
         <p:txBody>
           <a:bodyPr>
             <a:normAutofit fontScale="90000"/>
@@ -7599,75 +7585,75 @@
           <a:p>
             <a:r>
               <a:rPr lang="en-US"/>
-              <a:t>Generating data using Large Language Models (LLMs)</a:t>
-            </a:r>
-            <a:endParaRPr lang="en-US"/>
-          </a:p>
-        </p:txBody>
-      </p:sp>
-      <p:sp>
-        <p:nvSpPr>
-          <p:cNvPr id="3" name="Content Placeholder 2"/>
-          <p:cNvSpPr>
-            <a:spLocks noGrp="1"/>
-          </p:cNvSpPr>
+              <a:t>A taxonomy of LLMs-driven synthetic data</a:t>
+            </a:r>
+            <a:br>
+              <a:rPr lang="en-US"/>
+            </a:br>
+            <a:r>
+              <a:rPr lang="en-US"/>
+              <a:t>generation, curation, and evaluation</a:t>
+            </a:r>
+            <a:endParaRPr lang="en-US"/>
+          </a:p>
+        </p:txBody>
+      </p:sp>
+      <p:pic>
+        <p:nvPicPr>
+          <p:cNvPr id="4" name="Content Placeholder 3"/>
+          <p:cNvPicPr>
+            <a:picLocks noChangeAspect="1"/>
+          </p:cNvPicPr>
           <p:nvPr>
             <p:ph idx="1"/>
           </p:nvPr>
-        </p:nvSpPr>
-        <p:spPr/>
-        <p:txBody>
-          <a:bodyPr>
-            <a:normAutofit fontScale="55000"/>
+        </p:nvPicPr>
+        <p:blipFill>
+          <a:blip r:embed="rId1"/>
+          <a:stretch>
+            <a:fillRect/>
+          </a:stretch>
+        </p:blipFill>
+        <p:spPr>
+          <a:xfrm>
+            <a:off x="5715000" y="15875"/>
+            <a:ext cx="6189345" cy="6884670"/>
+          </a:xfrm>
+          <a:prstGeom prst="rect">
+            <a:avLst/>
+          </a:prstGeom>
+        </p:spPr>
+      </p:pic>
+      <p:sp>
+        <p:nvSpPr>
+          <p:cNvPr id="6" name="Text Box 5"/>
+          <p:cNvSpPr txBox="1"/>
+          <p:nvPr/>
+        </p:nvSpPr>
+        <p:spPr>
+          <a:xfrm>
+            <a:off x="314960" y="5360670"/>
+            <a:ext cx="4876165" cy="737235"/>
+          </a:xfrm>
+          <a:prstGeom prst="rect">
+            <a:avLst/>
+          </a:prstGeom>
+          <a:noFill/>
+        </p:spPr>
+        <p:txBody>
+          <a:bodyPr wrap="square" rtlCol="0" anchor="t">
+            <a:spAutoFit/>
           </a:bodyPr>
           <a:p>
             <a:r>
-              <a:rPr lang="en-US"/>
-              <a:t>Choose an LLM: Select a suitable LLM, such as OpenAI's GPT-4, which is powerful and versatile for generating various types of data.</a:t>
-            </a:r>
-            <a:endParaRPr lang="en-US"/>
-          </a:p>
-          <a:p>
-            <a:r>
-              <a:rPr lang="en-US"/>
-              <a:t>Set Up the Environment: Ensure you have access to the chosen LLM. This may involve using an API provided by the model's creators (e.g., OpenAI API for GPT-4).</a:t>
-            </a:r>
-            <a:endParaRPr lang="en-US"/>
-          </a:p>
-          <a:p>
-            <a:r>
-              <a:rPr lang="en-US"/>
-              <a:t>Define the Data Requirements: Clearly outline what type of data you need. This could be structured (like tables) or unstructured (like text paragraphs).</a:t>
-            </a:r>
-            <a:endParaRPr lang="en-US"/>
-          </a:p>
-          <a:p>
-            <a:r>
-              <a:rPr lang="en-US"/>
-              <a:t>Create Prompts: Design prompts that guide the LLM to generate the desired data. Prompts should be specific and detailed to get accurate outputs. For example, if you need customer reviews, a prompt might be: "Generate a positive customer review for a smartphone."</a:t>
-            </a:r>
-            <a:endParaRPr lang="en-US"/>
-          </a:p>
-          <a:p>
-            <a:r>
-              <a:rPr lang="en-US"/>
-              <a:t>Generate Data: Use the prompts to generate data. You can automate this process by writing scripts that call the LLM's API and store the generated data.</a:t>
-            </a:r>
-            <a:endParaRPr lang="en-US"/>
-          </a:p>
-          <a:p>
-            <a:r>
-              <a:rPr lang="en-US"/>
-              <a:t>Review and Refine: Evaluate the generated data for quality and relevance. Refine your prompts or adjust the model parameters (like temperature and max tokens) to improve the outputs.</a:t>
-            </a:r>
-            <a:endParaRPr lang="en-US"/>
-          </a:p>
-          <a:p>
-            <a:r>
-              <a:rPr lang="en-US"/>
-              <a:t>Post-Processing: Process the generated data as needed. This might include cleaning, structuring, or formatting the data to meet your specific requirements.</a:t>
-            </a:r>
-            <a:endParaRPr lang="en-US"/>
+              <a:rPr lang="en-US" sz="1400">
+                <a:sym typeface="+mn-ea"/>
+              </a:rPr>
+              <a:t>Long, Lin, et al. "On LLMs-driven synthetic data generation, curation, and evaluation: A survey." arXiv preprint arXiv:2406.15126 (2024).</a:t>
+            </a:r>
+            <a:endParaRPr lang="en-US" sz="1400">
+              <a:sym typeface="+mn-ea"/>
+            </a:endParaRPr>
           </a:p>
         </p:txBody>
       </p:sp>
@@ -7699,12 +7685,7 @@
             <p:ph type="title"/>
           </p:nvPr>
         </p:nvSpPr>
-        <p:spPr>
-          <a:xfrm>
-            <a:off x="643255" y="1787525"/>
-            <a:ext cx="4547870" cy="2459990"/>
-          </a:xfrm>
-        </p:spPr>
+        <p:spPr/>
         <p:txBody>
           <a:bodyPr>
             <a:normAutofit fontScale="90000"/>
@@ -7712,14 +7693,7 @@
           <a:p>
             <a:r>
               <a:rPr lang="en-US"/>
-              <a:t>A taxonomy of LLMs-driven synthetic data</a:t>
-            </a:r>
-            <a:br>
-              <a:rPr lang="en-US"/>
-            </a:br>
-            <a:r>
-              <a:rPr lang="en-US"/>
-              <a:t>generation, curation, and evaluation</a:t>
+              <a:t>Example prompts for data generation in the literature </a:t>
             </a:r>
             <a:endParaRPr lang="en-US"/>
           </a:p>
@@ -7743,8 +7717,8 @@
         </p:blipFill>
         <p:spPr>
           <a:xfrm>
-            <a:off x="5715000" y="15875"/>
-            <a:ext cx="6189345" cy="6884670"/>
+            <a:off x="467995" y="2343150"/>
+            <a:ext cx="11520170" cy="2621280"/>
           </a:xfrm>
           <a:prstGeom prst="rect">
             <a:avLst/>
@@ -7753,14 +7727,14 @@
       </p:pic>
       <p:sp>
         <p:nvSpPr>
-          <p:cNvPr id="6" name="Text Box 5"/>
+          <p:cNvPr id="7" name="Text Box 6"/>
           <p:cNvSpPr txBox="1"/>
           <p:nvPr/>
         </p:nvSpPr>
         <p:spPr>
           <a:xfrm>
-            <a:off x="314960" y="5360670"/>
-            <a:ext cx="4876165" cy="737235"/>
+            <a:off x="686435" y="6182360"/>
+            <a:ext cx="10471785" cy="306705"/>
           </a:xfrm>
           <a:prstGeom prst="rect">
             <a:avLst/>
@@ -7814,13 +7788,11 @@
         </p:nvSpPr>
         <p:spPr/>
         <p:txBody>
-          <a:bodyPr>
-            <a:normAutofit fontScale="90000"/>
-          </a:bodyPr>
+          <a:bodyPr/>
           <a:p>
             <a:r>
               <a:rPr lang="en-US"/>
-              <a:t>Example prompts for data generation in the literature </a:t>
+              <a:t>High quality data generation </a:t>
             </a:r>
             <a:endParaRPr lang="en-US"/>
           </a:p>
@@ -7844,8 +7816,8 @@
         </p:blipFill>
         <p:spPr>
           <a:xfrm>
-            <a:off x="897255" y="2343150"/>
-            <a:ext cx="10515600" cy="2392680"/>
+            <a:off x="335280" y="2158365"/>
+            <a:ext cx="11742420" cy="3883025"/>
           </a:xfrm>
           <a:prstGeom prst="rect">
             <a:avLst/>
@@ -7854,7 +7826,7 @@
       </p:pic>
       <p:sp>
         <p:nvSpPr>
-          <p:cNvPr id="7" name="Text Box 6"/>
+          <p:cNvPr id="5" name="Text Box 4"/>
           <p:cNvSpPr txBox="1"/>
           <p:nvPr/>
         </p:nvSpPr>
@@ -7915,13 +7887,15 @@
         </p:nvSpPr>
         <p:spPr/>
         <p:txBody>
-          <a:bodyPr/>
+          <a:bodyPr>
+            <a:normAutofit/>
+          </a:bodyPr>
           <a:p>
             <a:r>
               <a:rPr lang="en-US"/>
-              <a:t>High quality data generation </a:t>
-            </a:r>
-            <a:endParaRPr lang="en-US"/>
+              <a:t>Two dominant approaches of data curation</a:t>
+            </a:r>
+            <a:endParaRPr lang="en-US" sz="1400"/>
           </a:p>
         </p:txBody>
       </p:sp>
@@ -7943,8 +7917,8 @@
         </p:blipFill>
         <p:spPr>
           <a:xfrm>
-            <a:off x="335280" y="2158365"/>
-            <a:ext cx="11742420" cy="3883025"/>
+            <a:off x="1734185" y="1452880"/>
+            <a:ext cx="8112760" cy="4495800"/>
           </a:xfrm>
           <a:prstGeom prst="rect">
             <a:avLst/>
@@ -8015,14 +7989,14 @@
         <p:spPr/>
         <p:txBody>
           <a:bodyPr>
-            <a:normAutofit/>
+            <a:normAutofit fontScale="90000"/>
           </a:bodyPr>
           <a:p>
             <a:r>
               <a:rPr lang="en-US"/>
-              <a:t>Two dominant approaches of data curation</a:t>
-            </a:r>
-            <a:endParaRPr lang="en-US" sz="1400"/>
+              <a:t>Direct and indirect methods of data evaluation</a:t>
+            </a:r>
+            <a:endParaRPr lang="en-US"/>
           </a:p>
         </p:txBody>
       </p:sp>
@@ -8044,8 +8018,8 @@
         </p:blipFill>
         <p:spPr>
           <a:xfrm>
-            <a:off x="2580640" y="2052955"/>
-            <a:ext cx="7029450" cy="3895725"/>
+            <a:off x="2529840" y="1283335"/>
+            <a:ext cx="6420485" cy="4893945"/>
           </a:xfrm>
           <a:prstGeom prst="rect">
             <a:avLst/>
@@ -8094,107 +8068,6 @@
 </file>
 
 <file path=ppt/slides/slide17.xml><?xml version="1.0" encoding="utf-8"?>
-<p:sld xmlns:a="http://schemas.openxmlformats.org/drawingml/2006/main" xmlns:r="http://schemas.openxmlformats.org/officeDocument/2006/relationships" xmlns:p="http://schemas.openxmlformats.org/presentationml/2006/main">
-  <p:cSld>
-    <p:spTree>
-      <p:nvGrpSpPr>
-        <p:cNvPr id="1" name=""/>
-        <p:cNvGrpSpPr/>
-        <p:nvPr/>
-      </p:nvGrpSpPr>
-      <p:grpSpPr/>
-      <p:sp>
-        <p:nvSpPr>
-          <p:cNvPr id="2" name="Title 1"/>
-          <p:cNvSpPr>
-            <a:spLocks noGrp="1"/>
-          </p:cNvSpPr>
-          <p:nvPr>
-            <p:ph type="title"/>
-          </p:nvPr>
-        </p:nvSpPr>
-        <p:spPr/>
-        <p:txBody>
-          <a:bodyPr>
-            <a:normAutofit fontScale="90000"/>
-          </a:bodyPr>
-          <a:p>
-            <a:r>
-              <a:rPr lang="en-US"/>
-              <a:t>Direct and indirect methods of data evaluation</a:t>
-            </a:r>
-            <a:endParaRPr lang="en-US"/>
-          </a:p>
-        </p:txBody>
-      </p:sp>
-      <p:pic>
-        <p:nvPicPr>
-          <p:cNvPr id="4" name="Content Placeholder 3"/>
-          <p:cNvPicPr>
-            <a:picLocks noChangeAspect="1"/>
-          </p:cNvPicPr>
-          <p:nvPr>
-            <p:ph idx="1"/>
-          </p:nvPr>
-        </p:nvPicPr>
-        <p:blipFill>
-          <a:blip r:embed="rId1"/>
-          <a:stretch>
-            <a:fillRect/>
-          </a:stretch>
-        </p:blipFill>
-        <p:spPr>
-          <a:xfrm>
-            <a:off x="3241040" y="1825625"/>
-            <a:ext cx="5709285" cy="4351655"/>
-          </a:xfrm>
-          <a:prstGeom prst="rect">
-            <a:avLst/>
-          </a:prstGeom>
-        </p:spPr>
-      </p:pic>
-      <p:sp>
-        <p:nvSpPr>
-          <p:cNvPr id="5" name="Text Box 4"/>
-          <p:cNvSpPr txBox="1"/>
-          <p:nvPr/>
-        </p:nvSpPr>
-        <p:spPr>
-          <a:xfrm>
-            <a:off x="686435" y="6182360"/>
-            <a:ext cx="10471785" cy="306705"/>
-          </a:xfrm>
-          <a:prstGeom prst="rect">
-            <a:avLst/>
-          </a:prstGeom>
-          <a:noFill/>
-        </p:spPr>
-        <p:txBody>
-          <a:bodyPr wrap="square" rtlCol="0" anchor="t">
-            <a:spAutoFit/>
-          </a:bodyPr>
-          <a:p>
-            <a:r>
-              <a:rPr lang="en-US" sz="1400">
-                <a:sym typeface="+mn-ea"/>
-              </a:rPr>
-              <a:t>Long, Lin, et al. "On LLMs-driven synthetic data generation, curation, and evaluation: A survey." arXiv preprint arXiv:2406.15126 (2024).</a:t>
-            </a:r>
-            <a:endParaRPr lang="en-US" sz="1400">
-              <a:sym typeface="+mn-ea"/>
-            </a:endParaRPr>
-          </a:p>
-        </p:txBody>
-      </p:sp>
-    </p:spTree>
-  </p:cSld>
-  <p:clrMapOvr>
-    <a:masterClrMapping/>
-  </p:clrMapOvr>
-</p:sld>
-</file>
-
-<file path=ppt/slides/slide18.xml><?xml version="1.0" encoding="utf-8"?>
 <p:sld xmlns:a="http://schemas.openxmlformats.org/drawingml/2006/main" xmlns:r="http://schemas.openxmlformats.org/officeDocument/2006/relationships" xmlns:p="http://schemas.openxmlformats.org/presentationml/2006/main">
   <p:cSld>
     <p:spTree>
@@ -8296,6 +8169,82 @@
 </p:sld>
 </file>
 
+<file path=ppt/slides/slide18.xml><?xml version="1.0" encoding="utf-8"?>
+<p:sld xmlns:a="http://schemas.openxmlformats.org/drawingml/2006/main" xmlns:r="http://schemas.openxmlformats.org/officeDocument/2006/relationships" xmlns:p="http://schemas.openxmlformats.org/presentationml/2006/main">
+  <p:cSld>
+    <p:spTree>
+      <p:nvGrpSpPr>
+        <p:cNvPr id="1" name=""/>
+        <p:cNvGrpSpPr/>
+        <p:nvPr/>
+      </p:nvGrpSpPr>
+      <p:grpSpPr/>
+      <p:sp>
+        <p:nvSpPr>
+          <p:cNvPr id="2" name="Title 1"/>
+          <p:cNvSpPr>
+            <a:spLocks noGrp="1"/>
+          </p:cNvSpPr>
+          <p:nvPr>
+            <p:ph type="title"/>
+          </p:nvPr>
+        </p:nvSpPr>
+        <p:spPr/>
+        <p:txBody>
+          <a:bodyPr/>
+          <a:p>
+            <a:r>
+              <a:rPr lang="en-US"/>
+              <a:t>Open AI cookbook Synthetic data generation  </a:t>
+            </a:r>
+            <a:endParaRPr lang="en-US"/>
+          </a:p>
+        </p:txBody>
+      </p:sp>
+      <p:sp>
+        <p:nvSpPr>
+          <p:cNvPr id="3" name="Content Placeholder 2"/>
+          <p:cNvSpPr>
+            <a:spLocks noGrp="1"/>
+          </p:cNvSpPr>
+          <p:nvPr>
+            <p:ph idx="1"/>
+          </p:nvPr>
+        </p:nvSpPr>
+        <p:spPr/>
+        <p:txBody>
+          <a:bodyPr/>
+          <a:p>
+            <a:r>
+              <a:rPr lang="en-US"/>
+              <a:t>CSV with a structured prompt</a:t>
+            </a:r>
+            <a:endParaRPr lang="en-US"/>
+          </a:p>
+          <a:p>
+            <a:r>
+              <a:rPr lang="en-US"/>
+              <a:t>Multitable CSV with a python program</a:t>
+            </a:r>
+            <a:endParaRPr lang="en-US"/>
+          </a:p>
+          <a:p>
+            <a:r>
+              <a:rPr lang="en-US"/>
+              <a:t>creating textual data</a:t>
+            </a:r>
+            <a:endParaRPr lang="en-US"/>
+          </a:p>
+        </p:txBody>
+      </p:sp>
+    </p:spTree>
+  </p:cSld>
+  <p:clrMapOvr>
+    <a:masterClrMapping/>
+  </p:clrMapOvr>
+</p:sld>
+</file>
+
 <file path=ppt/slides/slide19.xml><?xml version="1.0" encoding="utf-8"?>
 <p:sld xmlns:a="http://schemas.openxmlformats.org/drawingml/2006/main" xmlns:r="http://schemas.openxmlformats.org/officeDocument/2006/relationships" xmlns:p="http://schemas.openxmlformats.org/presentationml/2006/main">
   <p:cSld>
@@ -8321,8 +8270,10 @@
           <a:bodyPr/>
           <a:p>
             <a:r>
-              <a:rPr lang="en-US"/>
-              <a:t>Open AI cookbook Synthetic data generation  </a:t>
+              <a:rPr lang="en-US">
+                <a:sym typeface="+mn-ea"/>
+              </a:rPr>
+              <a:t>CSV with a structured prompt</a:t>
             </a:r>
             <a:endParaRPr lang="en-US"/>
           </a:p>
@@ -8340,27 +8291,114 @@
         </p:nvSpPr>
         <p:spPr/>
         <p:txBody>
-          <a:bodyPr/>
-          <a:p>
-            <a:r>
-              <a:rPr lang="en-US"/>
-              <a:t>CSV with a structured prompt</a:t>
-            </a:r>
-            <a:endParaRPr lang="en-US"/>
-          </a:p>
-          <a:p>
-            <a:r>
-              <a:rPr lang="en-US"/>
-              <a:t>Multitable CSV with a python program</a:t>
-            </a:r>
-            <a:endParaRPr lang="en-US"/>
-          </a:p>
-          <a:p>
-            <a:r>
-              <a:rPr lang="en-US"/>
-              <a:t>creating textual data</a:t>
-            </a:r>
-            <a:endParaRPr lang="en-US"/>
+          <a:bodyPr>
+            <a:noAutofit/>
+          </a:bodyPr>
+          <a:p>
+            <a:pPr marL="0" indent="0">
+              <a:buNone/>
+            </a:pPr>
+            <a:r>
+              <a:rPr lang="en-US" sz="2000"/>
+              <a:t>"""</a:t>
+            </a:r>
+            <a:endParaRPr lang="en-US" sz="2000"/>
+          </a:p>
+          <a:p>
+            <a:pPr marL="0" indent="0">
+              <a:buNone/>
+            </a:pPr>
+            <a:r>
+              <a:rPr lang="en-US" sz="2000"/>
+              <a:t>Create a CSV file with 10 rows of housing data.</a:t>
+            </a:r>
+            <a:endParaRPr lang="en-US" sz="2000"/>
+          </a:p>
+          <a:p>
+            <a:pPr marL="0" indent="0">
+              <a:buNone/>
+            </a:pPr>
+            <a:r>
+              <a:rPr lang="en-US" sz="2000"/>
+              <a:t>Each row should include the following fields:</a:t>
+            </a:r>
+            <a:endParaRPr lang="en-US" sz="2000"/>
+          </a:p>
+          <a:p>
+            <a:pPr marL="0" indent="0">
+              <a:buNone/>
+            </a:pPr>
+            <a:r>
+              <a:rPr lang="en-US" sz="2000"/>
+              <a:t> - id (incrementing integer starting at 1)</a:t>
+            </a:r>
+            <a:endParaRPr lang="en-US" sz="2000"/>
+          </a:p>
+          <a:p>
+            <a:pPr marL="0" indent="0">
+              <a:buNone/>
+            </a:pPr>
+            <a:r>
+              <a:rPr lang="en-US" sz="2000"/>
+              <a:t> - house size (m^2)</a:t>
+            </a:r>
+            <a:endParaRPr lang="en-US" sz="2000"/>
+          </a:p>
+          <a:p>
+            <a:pPr marL="0" indent="0">
+              <a:buNone/>
+            </a:pPr>
+            <a:r>
+              <a:rPr lang="en-US" sz="2000"/>
+              <a:t> - house price</a:t>
+            </a:r>
+            <a:endParaRPr lang="en-US" sz="2000"/>
+          </a:p>
+          <a:p>
+            <a:pPr marL="0" indent="0">
+              <a:buNone/>
+            </a:pPr>
+            <a:r>
+              <a:rPr lang="en-US" sz="2000"/>
+              <a:t> - location</a:t>
+            </a:r>
+            <a:endParaRPr lang="en-US" sz="2000"/>
+          </a:p>
+          <a:p>
+            <a:pPr marL="0" indent="0">
+              <a:buNone/>
+            </a:pPr>
+            <a:r>
+              <a:rPr lang="en-US" sz="2000"/>
+              <a:t> - number of bedrooms</a:t>
+            </a:r>
+            <a:endParaRPr lang="en-US" sz="2000"/>
+          </a:p>
+          <a:p>
+            <a:pPr marL="0" indent="0">
+              <a:buNone/>
+            </a:pPr>
+            <a:endParaRPr lang="en-US" sz="2000"/>
+          </a:p>
+          <a:p>
+            <a:pPr marL="0" indent="0">
+              <a:buNone/>
+            </a:pPr>
+            <a:r>
+              <a:rPr lang="en-US" sz="2000"/>
+              <a:t>Make sure that the numbers make sense (i.e. more rooms is usually bigger size, more expensive locations increase price. more size is usually higher price etc. make sure all the numbers make sense). Also only respond with the CSV.</a:t>
+            </a:r>
+            <a:endParaRPr lang="en-US" sz="2000"/>
+          </a:p>
+          <a:p>
+            <a:pPr marL="0" indent="0">
+              <a:buNone/>
+            </a:pPr>
+            <a:r>
+              <a:rPr lang="en-US" sz="2000"/>
+              <a:t>"""</a:t>
+            </a:r>
+            <a:endParaRPr lang="en-US" sz="2000"/>
           </a:p>
         </p:txBody>
       </p:sp>
@@ -8459,10 +8497,8 @@
           <a:bodyPr/>
           <a:p>
             <a:r>
-              <a:rPr lang="en-US">
-                <a:sym typeface="+mn-ea"/>
-              </a:rPr>
-              <a:t>CSV with a structured prompt</a:t>
+              <a:rPr lang="en-US"/>
+              <a:t>result </a:t>
             </a:r>
             <a:endParaRPr lang="en-US"/>
           </a:p>
@@ -8481,113 +8517,98 @@
         <p:spPr/>
         <p:txBody>
           <a:bodyPr>
-            <a:noAutofit/>
+            <a:normAutofit fontScale="50000"/>
           </a:bodyPr>
           <a:p>
-            <a:pPr marL="0" indent="0">
-              <a:buNone/>
-            </a:pPr>
-            <a:r>
-              <a:rPr lang="en-US" sz="2000"/>
-              <a:t>"""</a:t>
-            </a:r>
-            <a:endParaRPr lang="en-US" sz="2000"/>
-          </a:p>
-          <a:p>
-            <a:pPr marL="0" indent="0">
-              <a:buNone/>
-            </a:pPr>
-            <a:r>
-              <a:rPr lang="en-US" sz="2000"/>
-              <a:t>Create a CSV file with 10 rows of housing data.</a:t>
-            </a:r>
-            <a:endParaRPr lang="en-US" sz="2000"/>
-          </a:p>
-          <a:p>
-            <a:pPr marL="0" indent="0">
-              <a:buNone/>
-            </a:pPr>
-            <a:r>
-              <a:rPr lang="en-US" sz="2000"/>
-              <a:t>Each row should include the following fields:</a:t>
-            </a:r>
-            <a:endParaRPr lang="en-US" sz="2000"/>
-          </a:p>
-          <a:p>
-            <a:pPr marL="0" indent="0">
-              <a:buNone/>
-            </a:pPr>
-            <a:r>
-              <a:rPr lang="en-US" sz="2000"/>
-              <a:t> - id (incrementing integer starting at 1)</a:t>
-            </a:r>
-            <a:endParaRPr lang="en-US" sz="2000"/>
-          </a:p>
-          <a:p>
-            <a:pPr marL="0" indent="0">
-              <a:buNone/>
-            </a:pPr>
-            <a:r>
-              <a:rPr lang="en-US" sz="2000"/>
-              <a:t> - house size (m^2)</a:t>
-            </a:r>
-            <a:endParaRPr lang="en-US" sz="2000"/>
-          </a:p>
-          <a:p>
-            <a:pPr marL="0" indent="0">
-              <a:buNone/>
-            </a:pPr>
-            <a:r>
-              <a:rPr lang="en-US" sz="2000"/>
-              <a:t> - house price</a:t>
-            </a:r>
-            <a:endParaRPr lang="en-US" sz="2000"/>
-          </a:p>
-          <a:p>
-            <a:pPr marL="0" indent="0">
-              <a:buNone/>
-            </a:pPr>
-            <a:r>
-              <a:rPr lang="en-US" sz="2000"/>
-              <a:t> - location</a:t>
-            </a:r>
-            <a:endParaRPr lang="en-US" sz="2000"/>
-          </a:p>
-          <a:p>
-            <a:pPr marL="0" indent="0">
-              <a:buNone/>
-            </a:pPr>
-            <a:r>
-              <a:rPr lang="en-US" sz="2000"/>
-              <a:t> - number of bedrooms</a:t>
-            </a:r>
-            <a:endParaRPr lang="en-US" sz="2000"/>
-          </a:p>
-          <a:p>
-            <a:pPr marL="0" indent="0">
-              <a:buNone/>
-            </a:pPr>
-            <a:endParaRPr lang="en-US" sz="2000"/>
-          </a:p>
-          <a:p>
-            <a:pPr marL="0" indent="0">
-              <a:buNone/>
-            </a:pPr>
-            <a:r>
-              <a:rPr lang="en-US" sz="2000"/>
-              <a:t>Make sure that the numbers make sense (i.e. more rooms is usually bigger size, more expensive locations increase price. more size is usually higher price etc. make sure all the numbers make sense). Also only respond with the CSV.</a:t>
-            </a:r>
-            <a:endParaRPr lang="en-US" sz="2000"/>
-          </a:p>
-          <a:p>
-            <a:pPr marL="0" indent="0">
-              <a:buNone/>
-            </a:pPr>
-            <a:r>
-              <a:rPr lang="en-US" sz="2000"/>
-              <a:t>"""</a:t>
-            </a:r>
-            <a:endParaRPr lang="en-US" sz="2000"/>
+            <a:r>
+              <a:rPr lang="en-US"/>
+              <a:t>```csv</a:t>
+            </a:r>
+            <a:endParaRPr lang="en-US"/>
+          </a:p>
+          <a:p>
+            <a:r>
+              <a:rPr lang="en-US"/>
+              <a:t>id,house_size_m2,house_price,location,number_of_bedrooms</a:t>
+            </a:r>
+            <a:endParaRPr lang="en-US"/>
+          </a:p>
+          <a:p>
+            <a:r>
+              <a:rPr lang="en-US"/>
+              <a:t>1,50,150000,Suburban,2</a:t>
+            </a:r>
+            <a:endParaRPr lang="en-US"/>
+          </a:p>
+          <a:p>
+            <a:r>
+              <a:rPr lang="en-US"/>
+              <a:t>2,75,250000,City Center,3</a:t>
+            </a:r>
+            <a:endParaRPr lang="en-US"/>
+          </a:p>
+          <a:p>
+            <a:r>
+              <a:rPr lang="en-US"/>
+              <a:t>3,100,350000,Suburban,4</a:t>
+            </a:r>
+            <a:endParaRPr lang="en-US"/>
+          </a:p>
+          <a:p>
+            <a:r>
+              <a:rPr lang="en-US"/>
+              <a:t>4,120,450000,Suburban,4</a:t>
+            </a:r>
+            <a:endParaRPr lang="en-US"/>
+          </a:p>
+          <a:p>
+            <a:r>
+              <a:rPr lang="en-US"/>
+              <a:t>5,80,300000,City Center,3</a:t>
+            </a:r>
+            <a:endParaRPr lang="en-US"/>
+          </a:p>
+          <a:p>
+            <a:r>
+              <a:rPr lang="en-US"/>
+              <a:t>6,90,400000,City Center,3</a:t>
+            </a:r>
+            <a:endParaRPr lang="en-US"/>
+          </a:p>
+          <a:p>
+            <a:r>
+              <a:rPr lang="en-US"/>
+              <a:t>7,150,600000,Premium Area,5</a:t>
+            </a:r>
+            <a:endParaRPr lang="en-US"/>
+          </a:p>
+          <a:p>
+            <a:r>
+              <a:rPr lang="en-US"/>
+              <a:t>8,200,750000,Premium Area,5</a:t>
+            </a:r>
+            <a:endParaRPr lang="en-US"/>
+          </a:p>
+          <a:p>
+            <a:r>
+              <a:rPr lang="en-US"/>
+              <a:t>9,55,180000,Suburban,2</a:t>
+            </a:r>
+            <a:endParaRPr lang="en-US"/>
+          </a:p>
+          <a:p>
+            <a:r>
+              <a:rPr lang="en-US"/>
+              <a:t>10,300,950000,Premium Area,6</a:t>
+            </a:r>
+            <a:endParaRPr lang="en-US"/>
+          </a:p>
+          <a:p>
+            <a:r>
+              <a:rPr lang="en-US"/>
+              <a:t>```</a:t>
+            </a:r>
+            <a:endParaRPr lang="en-US"/>
           </a:p>
         </p:txBody>
       </p:sp>
@@ -8611,7 +8632,7 @@
       <p:grpSpPr/>
       <p:sp>
         <p:nvSpPr>
-          <p:cNvPr id="2" name="Title 1"/>
+          <p:cNvPr id="4" name="Title 3"/>
           <p:cNvSpPr>
             <a:spLocks noGrp="1"/>
           </p:cNvSpPr>
@@ -8619,122 +8640,401 @@
             <p:ph type="title"/>
           </p:nvPr>
         </p:nvSpPr>
-        <p:spPr/>
-        <p:txBody>
-          <a:bodyPr/>
-          <a:p>
-            <a:r>
-              <a:rPr lang="en-US"/>
-              <a:t>result </a:t>
-            </a:r>
-            <a:endParaRPr lang="en-US"/>
-          </a:p>
-        </p:txBody>
-      </p:sp>
-      <p:sp>
-        <p:nvSpPr>
-          <p:cNvPr id="3" name="Content Placeholder 2"/>
-          <p:cNvSpPr>
-            <a:spLocks noGrp="1"/>
-          </p:cNvSpPr>
-          <p:nvPr>
-            <p:ph idx="1"/>
-          </p:nvPr>
-        </p:nvSpPr>
-        <p:spPr/>
+        <p:spPr>
+          <a:xfrm>
+            <a:off x="838200" y="-635"/>
+            <a:ext cx="10515600" cy="922655"/>
+          </a:xfrm>
+        </p:spPr>
+        <p:txBody>
+          <a:bodyPr>
+            <a:normAutofit/>
+          </a:bodyPr>
+          <a:p>
+            <a:r>
+              <a:rPr lang="en-US">
+                <a:sym typeface="+mn-ea"/>
+              </a:rPr>
+              <a:t>Multitable CSV with a python program</a:t>
+            </a:r>
+            <a:endParaRPr lang="en-US"/>
+          </a:p>
+        </p:txBody>
+      </p:sp>
+      <p:sp>
+        <p:nvSpPr>
+          <p:cNvPr id="5" name="Content Placeholder 4"/>
+          <p:cNvSpPr>
+            <a:spLocks noGrp="1"/>
+          </p:cNvSpPr>
+          <p:nvPr>
+            <p:ph sz="half" idx="1"/>
+          </p:nvPr>
+        </p:nvSpPr>
+        <p:spPr>
+          <a:xfrm>
+            <a:off x="838200" y="922020"/>
+            <a:ext cx="5181600" cy="5255260"/>
+          </a:xfrm>
+        </p:spPr>
+        <p:txBody>
+          <a:bodyPr>
+            <a:noAutofit/>
+          </a:bodyPr>
+          <a:p>
+            <a:pPr marL="0" indent="0">
+              <a:buNone/>
+            </a:pPr>
+            <a:r>
+              <a:rPr lang="en-US" sz="1200"/>
+              <a:t>"""</a:t>
+            </a:r>
+            <a:endParaRPr lang="en-US" sz="1200"/>
+          </a:p>
+          <a:p>
+            <a:pPr marL="0" indent="0">
+              <a:buNone/>
+            </a:pPr>
+            <a:r>
+              <a:rPr lang="en-US" sz="1200"/>
+              <a:t>Create a Python program to generate 3 different pandas dataframes.</a:t>
+            </a:r>
+            <a:endParaRPr lang="en-US" sz="1200"/>
+          </a:p>
+          <a:p>
+            <a:pPr marL="0" indent="0">
+              <a:buNone/>
+            </a:pPr>
+            <a:r>
+              <a:rPr lang="en-US" sz="1200"/>
+              <a:t>1. Housing data</a:t>
+            </a:r>
+            <a:endParaRPr lang="en-US" sz="1200"/>
+          </a:p>
+          <a:p>
+            <a:pPr marL="0" indent="0">
+              <a:buNone/>
+            </a:pPr>
+            <a:r>
+              <a:rPr lang="en-US" sz="1200"/>
+              <a:t>I want 100 rows. Each row should include the following fields:</a:t>
+            </a:r>
+            <a:endParaRPr lang="en-US" sz="1200"/>
+          </a:p>
+          <a:p>
+            <a:pPr marL="0" indent="0">
+              <a:buNone/>
+            </a:pPr>
+            <a:r>
+              <a:rPr lang="en-US" sz="1200"/>
+              <a:t> - id (incrementing integer starting at 1)</a:t>
+            </a:r>
+            <a:endParaRPr lang="en-US" sz="1200"/>
+          </a:p>
+          <a:p>
+            <a:pPr marL="0" indent="0">
+              <a:buNone/>
+            </a:pPr>
+            <a:r>
+              <a:rPr lang="en-US" sz="1200"/>
+              <a:t> - house size (m^2)</a:t>
+            </a:r>
+            <a:endParaRPr lang="en-US" sz="1200"/>
+          </a:p>
+          <a:p>
+            <a:pPr marL="0" indent="0">
+              <a:buNone/>
+            </a:pPr>
+            <a:r>
+              <a:rPr lang="en-US" sz="1200"/>
+              <a:t> - house price</a:t>
+            </a:r>
+            <a:endParaRPr lang="en-US" sz="1200"/>
+          </a:p>
+          <a:p>
+            <a:pPr marL="0" indent="0">
+              <a:buNone/>
+            </a:pPr>
+            <a:r>
+              <a:rPr lang="en-US" sz="1200"/>
+              <a:t> - location</a:t>
+            </a:r>
+            <a:endParaRPr lang="en-US" sz="1200"/>
+          </a:p>
+          <a:p>
+            <a:pPr marL="0" indent="0">
+              <a:buNone/>
+            </a:pPr>
+            <a:r>
+              <a:rPr lang="en-US" sz="1200"/>
+              <a:t> - number of bedrooms</a:t>
+            </a:r>
+            <a:endParaRPr lang="en-US" sz="1200"/>
+          </a:p>
+          <a:p>
+            <a:pPr marL="0" indent="0">
+              <a:buNone/>
+            </a:pPr>
+            <a:r>
+              <a:rPr lang="en-US" sz="1200"/>
+              <a:t> - house type</a:t>
+            </a:r>
+            <a:endParaRPr lang="en-US" sz="1200"/>
+          </a:p>
+          <a:p>
+            <a:pPr marL="0" indent="0">
+              <a:buNone/>
+            </a:pPr>
+            <a:r>
+              <a:rPr lang="en-US" sz="1200"/>
+              <a:t> + any relevant foreign keys</a:t>
+            </a:r>
+            <a:endParaRPr lang="en-US" sz="1200"/>
+          </a:p>
+          <a:p>
+            <a:pPr marL="0" indent="0">
+              <a:buNone/>
+            </a:pPr>
+            <a:r>
+              <a:rPr lang="en-US" sz="1200"/>
+              <a:t>2. Location</a:t>
+            </a:r>
+            <a:endParaRPr lang="en-US" sz="1200"/>
+          </a:p>
+          <a:p>
+            <a:pPr marL="0" indent="0">
+              <a:buNone/>
+            </a:pPr>
+            <a:r>
+              <a:rPr lang="en-US" sz="1200"/>
+              <a:t>Each row should include the following fields:</a:t>
+            </a:r>
+            <a:endParaRPr lang="en-US" sz="1200"/>
+          </a:p>
+          <a:p>
+            <a:pPr marL="0" indent="0">
+              <a:buNone/>
+            </a:pPr>
+            <a:r>
+              <a:rPr lang="en-US" sz="1200"/>
+              <a:t> - id (incrementing integer starting at 1)</a:t>
+            </a:r>
+            <a:endParaRPr lang="en-US" sz="1200"/>
+          </a:p>
+          <a:p>
+            <a:pPr marL="0" indent="0">
+              <a:buNone/>
+            </a:pPr>
+            <a:r>
+              <a:rPr lang="en-US" sz="1200"/>
+              <a:t> - country</a:t>
+            </a:r>
+            <a:endParaRPr lang="en-US" sz="1200"/>
+          </a:p>
+          <a:p>
+            <a:pPr marL="0" indent="0">
+              <a:buNone/>
+            </a:pPr>
+            <a:r>
+              <a:rPr lang="en-US" sz="1200"/>
+              <a:t> - city</a:t>
+            </a:r>
+            <a:endParaRPr lang="en-US" sz="1200"/>
+          </a:p>
+          <a:p>
+            <a:pPr marL="0" indent="0">
+              <a:buNone/>
+            </a:pPr>
+            <a:r>
+              <a:rPr lang="en-US" sz="1200"/>
+              <a:t> - population</a:t>
+            </a:r>
+            <a:endParaRPr lang="en-US" sz="1200"/>
+          </a:p>
+          <a:p>
+            <a:pPr marL="0" indent="0">
+              <a:buNone/>
+            </a:pPr>
+            <a:r>
+              <a:rPr lang="en-US" sz="1200"/>
+              <a:t> - area (m^2)</a:t>
+            </a:r>
+            <a:endParaRPr lang="en-US" sz="1200"/>
+          </a:p>
+          <a:p>
+            <a:pPr marL="0" indent="0">
+              <a:buNone/>
+            </a:pPr>
+            <a:r>
+              <a:rPr lang="en-US" sz="1200"/>
+              <a:t> + any relevant foreign keys</a:t>
+            </a:r>
+            <a:endParaRPr lang="en-US" sz="1200"/>
+          </a:p>
+        </p:txBody>
+      </p:sp>
+      <p:sp>
+        <p:nvSpPr>
+          <p:cNvPr id="6" name="Content Placeholder 5"/>
+          <p:cNvSpPr>
+            <a:spLocks noGrp="1"/>
+          </p:cNvSpPr>
+          <p:nvPr>
+            <p:ph sz="half" idx="2"/>
+          </p:nvPr>
+        </p:nvSpPr>
+        <p:spPr>
+          <a:xfrm>
+            <a:off x="6172200" y="922020"/>
+            <a:ext cx="5181600" cy="5255260"/>
+          </a:xfrm>
+        </p:spPr>
         <p:txBody>
           <a:bodyPr>
             <a:normAutofit fontScale="50000"/>
           </a:bodyPr>
           <a:p>
-            <a:r>
-              <a:rPr lang="en-US"/>
-              <a:t>```csv</a:t>
-            </a:r>
-            <a:endParaRPr lang="en-US"/>
-          </a:p>
-          <a:p>
-            <a:r>
-              <a:rPr lang="en-US"/>
-              <a:t>id,house_size_m2,house_price,location,number_of_bedrooms</a:t>
-            </a:r>
-            <a:endParaRPr lang="en-US"/>
-          </a:p>
-          <a:p>
-            <a:r>
-              <a:rPr lang="en-US"/>
-              <a:t>1,50,150000,Suburban,2</a:t>
-            </a:r>
-            <a:endParaRPr lang="en-US"/>
-          </a:p>
-          <a:p>
-            <a:r>
-              <a:rPr lang="en-US"/>
-              <a:t>2,75,250000,City Center,3</a:t>
-            </a:r>
-            <a:endParaRPr lang="en-US"/>
-          </a:p>
-          <a:p>
-            <a:r>
-              <a:rPr lang="en-US"/>
-              <a:t>3,100,350000,Suburban,4</a:t>
-            </a:r>
-            <a:endParaRPr lang="en-US"/>
-          </a:p>
-          <a:p>
-            <a:r>
-              <a:rPr lang="en-US"/>
-              <a:t>4,120,450000,Suburban,4</a:t>
-            </a:r>
-            <a:endParaRPr lang="en-US"/>
-          </a:p>
-          <a:p>
-            <a:r>
-              <a:rPr lang="en-US"/>
-              <a:t>5,80,300000,City Center,3</a:t>
-            </a:r>
-            <a:endParaRPr lang="en-US"/>
-          </a:p>
-          <a:p>
-            <a:r>
-              <a:rPr lang="en-US"/>
-              <a:t>6,90,400000,City Center,3</a:t>
-            </a:r>
-            <a:endParaRPr lang="en-US"/>
-          </a:p>
-          <a:p>
-            <a:r>
-              <a:rPr lang="en-US"/>
-              <a:t>7,150,600000,Premium Area,5</a:t>
-            </a:r>
-            <a:endParaRPr lang="en-US"/>
-          </a:p>
-          <a:p>
-            <a:r>
-              <a:rPr lang="en-US"/>
-              <a:t>8,200,750000,Premium Area,5</a:t>
-            </a:r>
-            <a:endParaRPr lang="en-US"/>
-          </a:p>
-          <a:p>
-            <a:r>
-              <a:rPr lang="en-US"/>
-              <a:t>9,55,180000,Suburban,2</a:t>
-            </a:r>
-            <a:endParaRPr lang="en-US"/>
-          </a:p>
-          <a:p>
-            <a:r>
-              <a:rPr lang="en-US"/>
-              <a:t>10,300,950000,Premium Area,6</a:t>
-            </a:r>
-            <a:endParaRPr lang="en-US"/>
-          </a:p>
-          <a:p>
-            <a:r>
-              <a:rPr lang="en-US"/>
-              <a:t>```</a:t>
-            </a:r>
+            <a:pPr marL="0" indent="0">
+              <a:buNone/>
+            </a:pPr>
+            <a:r>
+              <a:rPr lang="en-US">
+                <a:sym typeface="+mn-ea"/>
+              </a:rPr>
+              <a:t> 3. House types</a:t>
+            </a:r>
+            <a:endParaRPr lang="en-US"/>
+          </a:p>
+          <a:p>
+            <a:pPr marL="0" indent="0">
+              <a:buNone/>
+            </a:pPr>
+            <a:r>
+              <a:rPr lang="en-US">
+                <a:sym typeface="+mn-ea"/>
+              </a:rPr>
+              <a:t> - id (incrementing integer starting at 1)</a:t>
+            </a:r>
+            <a:endParaRPr lang="en-US"/>
+          </a:p>
+          <a:p>
+            <a:pPr marL="0" indent="0">
+              <a:buNone/>
+            </a:pPr>
+            <a:r>
+              <a:rPr lang="en-US">
+                <a:sym typeface="+mn-ea"/>
+              </a:rPr>
+              <a:t> - house type</a:t>
+            </a:r>
+            <a:endParaRPr lang="en-US"/>
+          </a:p>
+          <a:p>
+            <a:pPr marL="0" indent="0">
+              <a:buNone/>
+            </a:pPr>
+            <a:r>
+              <a:rPr lang="en-US">
+                <a:sym typeface="+mn-ea"/>
+              </a:rPr>
+              <a:t> - average house type price</a:t>
+            </a:r>
+            <a:endParaRPr lang="en-US"/>
+          </a:p>
+          <a:p>
+            <a:pPr marL="0" indent="0">
+              <a:buNone/>
+            </a:pPr>
+            <a:r>
+              <a:rPr lang="en-US">
+                <a:sym typeface="+mn-ea"/>
+              </a:rPr>
+              <a:t> - number of houses</a:t>
+            </a:r>
+            <a:endParaRPr lang="en-US"/>
+          </a:p>
+          <a:p>
+            <a:pPr marL="0" indent="0">
+              <a:buNone/>
+            </a:pPr>
+            <a:r>
+              <a:rPr lang="en-US">
+                <a:sym typeface="+mn-ea"/>
+              </a:rPr>
+              <a:t> + any relevant foreign keys</a:t>
+            </a:r>
+            <a:endParaRPr lang="en-US"/>
+          </a:p>
+          <a:p>
+            <a:pPr marL="0" indent="0">
+              <a:buNone/>
+            </a:pPr>
+            <a:endParaRPr lang="en-US"/>
+          </a:p>
+          <a:p>
+            <a:pPr marL="0" indent="0">
+              <a:buNone/>
+            </a:pPr>
+            <a:r>
+              <a:rPr lang="en-US">
+                <a:sym typeface="+mn-ea"/>
+              </a:rPr>
+              <a:t>Make sure that the numbers make sense (i.e. more rooms is usually bigger size, more expensive locations increase price. more size is usually higher price etc. make sure all the numbers make sense).</a:t>
+            </a:r>
+            <a:endParaRPr lang="en-US"/>
+          </a:p>
+          <a:p>
+            <a:pPr marL="0" indent="0">
+              <a:buNone/>
+            </a:pPr>
+            <a:r>
+              <a:rPr lang="en-US">
+                <a:sym typeface="+mn-ea"/>
+              </a:rPr>
+              <a:t>Make sure that the dataframe generally follow common sense checks, e.g. the size of the dataframes make sense in comparison with one another.</a:t>
+            </a:r>
+            <a:endParaRPr lang="en-US"/>
+          </a:p>
+          <a:p>
+            <a:pPr marL="0" indent="0">
+              <a:buNone/>
+            </a:pPr>
+            <a:r>
+              <a:rPr lang="en-US">
+                <a:sym typeface="+mn-ea"/>
+              </a:rPr>
+              <a:t>Make sure the foreign keys match up and you can use previously generated dataframes when creating each consecutive dataframes.</a:t>
+            </a:r>
+            <a:endParaRPr lang="en-US"/>
+          </a:p>
+          <a:p>
+            <a:pPr marL="0" indent="0">
+              <a:buNone/>
+            </a:pPr>
+            <a:r>
+              <a:rPr lang="en-US">
+                <a:sym typeface="+mn-ea"/>
+              </a:rPr>
+              <a:t>You can use the previously generated dataframe to generate the next dataframe.</a:t>
+            </a:r>
+            <a:endParaRPr lang="en-US"/>
+          </a:p>
+          <a:p>
+            <a:pPr marL="0" indent="0">
+              <a:buNone/>
+            </a:pPr>
+            <a:r>
+              <a:rPr lang="en-US">
+                <a:sym typeface="+mn-ea"/>
+              </a:rPr>
+              <a:t>"""</a:t>
+            </a:r>
+            <a:endParaRPr lang="en-US"/>
+          </a:p>
+          <a:p>
+            <a:pPr marL="0" indent="0">
+              <a:buNone/>
+            </a:pPr>
             <a:endParaRPr lang="en-US"/>
           </a:p>
         </p:txBody>
@@ -8759,7 +9059,7 @@
       <p:grpSpPr/>
       <p:sp>
         <p:nvSpPr>
-          <p:cNvPr id="4" name="Title 3"/>
+          <p:cNvPr id="2" name="Title 1"/>
           <p:cNvSpPr>
             <a:spLocks noGrp="1"/>
           </p:cNvSpPr>
@@ -8767,22 +9067,13 @@
             <p:ph type="title"/>
           </p:nvPr>
         </p:nvSpPr>
-        <p:spPr>
-          <a:xfrm>
-            <a:off x="838200" y="-635"/>
-            <a:ext cx="10515600" cy="922655"/>
-          </a:xfrm>
-        </p:spPr>
-        <p:txBody>
-          <a:bodyPr>
-            <a:normAutofit/>
-          </a:bodyPr>
-          <a:p>
-            <a:r>
-              <a:rPr lang="en-US">
-                <a:sym typeface="+mn-ea"/>
-              </a:rPr>
-              <a:t>Multitable CSV with a python program</a:t>
+        <p:spPr/>
+        <p:txBody>
+          <a:bodyPr/>
+          <a:p>
+            <a:r>
+              <a:rPr lang="en-US"/>
+              <a:t>creating textual data</a:t>
             </a:r>
             <a:endParaRPr lang="en-US"/>
           </a:p>
@@ -8795,227 +9086,10 @@
             <a:spLocks noGrp="1"/>
           </p:cNvSpPr>
           <p:nvPr>
-            <p:ph sz="half" idx="1"/>
-          </p:nvPr>
-        </p:nvSpPr>
-        <p:spPr>
-          <a:xfrm>
-            <a:off x="838200" y="922020"/>
-            <a:ext cx="5181600" cy="5255260"/>
-          </a:xfrm>
-        </p:spPr>
-        <p:txBody>
-          <a:bodyPr>
-            <a:noAutofit/>
-          </a:bodyPr>
-          <a:p>
-            <a:pPr marL="0" indent="0">
-              <a:buNone/>
-            </a:pPr>
-            <a:r>
-              <a:rPr lang="en-US" sz="1200"/>
-              <a:t>"""</a:t>
-            </a:r>
-            <a:endParaRPr lang="en-US" sz="1200"/>
-          </a:p>
-          <a:p>
-            <a:pPr marL="0" indent="0">
-              <a:buNone/>
-            </a:pPr>
-            <a:r>
-              <a:rPr lang="en-US" sz="1200"/>
-              <a:t>Create a Python program to generate 3 different pandas dataframes.</a:t>
-            </a:r>
-            <a:endParaRPr lang="en-US" sz="1200"/>
-          </a:p>
-          <a:p>
-            <a:pPr marL="0" indent="0">
-              <a:buNone/>
-            </a:pPr>
-            <a:r>
-              <a:rPr lang="en-US" sz="1200"/>
-              <a:t>1. Housing data</a:t>
-            </a:r>
-            <a:endParaRPr lang="en-US" sz="1200"/>
-          </a:p>
-          <a:p>
-            <a:pPr marL="0" indent="0">
-              <a:buNone/>
-            </a:pPr>
-            <a:r>
-              <a:rPr lang="en-US" sz="1200"/>
-              <a:t>I want 100 rows. Each row should include the following fields:</a:t>
-            </a:r>
-            <a:endParaRPr lang="en-US" sz="1200"/>
-          </a:p>
-          <a:p>
-            <a:pPr marL="0" indent="0">
-              <a:buNone/>
-            </a:pPr>
-            <a:r>
-              <a:rPr lang="en-US" sz="1200"/>
-              <a:t> - id (incrementing integer starting at 1)</a:t>
-            </a:r>
-            <a:endParaRPr lang="en-US" sz="1200"/>
-          </a:p>
-          <a:p>
-            <a:pPr marL="0" indent="0">
-              <a:buNone/>
-            </a:pPr>
-            <a:r>
-              <a:rPr lang="en-US" sz="1200"/>
-              <a:t> - house size (m^2)</a:t>
-            </a:r>
-            <a:endParaRPr lang="en-US" sz="1200"/>
-          </a:p>
-          <a:p>
-            <a:pPr marL="0" indent="0">
-              <a:buNone/>
-            </a:pPr>
-            <a:r>
-              <a:rPr lang="en-US" sz="1200"/>
-              <a:t> - house price</a:t>
-            </a:r>
-            <a:endParaRPr lang="en-US" sz="1200"/>
-          </a:p>
-          <a:p>
-            <a:pPr marL="0" indent="0">
-              <a:buNone/>
-            </a:pPr>
-            <a:r>
-              <a:rPr lang="en-US" sz="1200"/>
-              <a:t> - location</a:t>
-            </a:r>
-            <a:endParaRPr lang="en-US" sz="1200"/>
-          </a:p>
-          <a:p>
-            <a:pPr marL="0" indent="0">
-              <a:buNone/>
-            </a:pPr>
-            <a:r>
-              <a:rPr lang="en-US" sz="1200"/>
-              <a:t> - number of bedrooms</a:t>
-            </a:r>
-            <a:endParaRPr lang="en-US" sz="1200"/>
-          </a:p>
-          <a:p>
-            <a:pPr marL="0" indent="0">
-              <a:buNone/>
-            </a:pPr>
-            <a:r>
-              <a:rPr lang="en-US" sz="1200"/>
-              <a:t> - house type</a:t>
-            </a:r>
-            <a:endParaRPr lang="en-US" sz="1200"/>
-          </a:p>
-          <a:p>
-            <a:pPr marL="0" indent="0">
-              <a:buNone/>
-            </a:pPr>
-            <a:r>
-              <a:rPr lang="en-US" sz="1200"/>
-              <a:t> + any relevant foreign keys</a:t>
-            </a:r>
-            <a:endParaRPr lang="en-US" sz="1200"/>
-          </a:p>
-          <a:p>
-            <a:pPr marL="0" indent="0">
-              <a:buNone/>
-            </a:pPr>
-            <a:r>
-              <a:rPr lang="en-US" sz="1200"/>
-              <a:t>2. Location</a:t>
-            </a:r>
-            <a:endParaRPr lang="en-US" sz="1200"/>
-          </a:p>
-          <a:p>
-            <a:pPr marL="0" indent="0">
-              <a:buNone/>
-            </a:pPr>
-            <a:r>
-              <a:rPr lang="en-US" sz="1200"/>
-              <a:t>Each row should include the following fields:</a:t>
-            </a:r>
-            <a:endParaRPr lang="en-US" sz="1200"/>
-          </a:p>
-          <a:p>
-            <a:pPr marL="0" indent="0">
-              <a:buNone/>
-            </a:pPr>
-            <a:r>
-              <a:rPr lang="en-US" sz="1200"/>
-              <a:t> - id (incrementing integer starting at 1)</a:t>
-            </a:r>
-            <a:endParaRPr lang="en-US" sz="1200"/>
-          </a:p>
-          <a:p>
-            <a:pPr marL="0" indent="0">
-              <a:buNone/>
-            </a:pPr>
-            <a:r>
-              <a:rPr lang="en-US" sz="1200"/>
-              <a:t> - country</a:t>
-            </a:r>
-            <a:endParaRPr lang="en-US" sz="1200"/>
-          </a:p>
-          <a:p>
-            <a:pPr marL="0" indent="0">
-              <a:buNone/>
-            </a:pPr>
-            <a:r>
-              <a:rPr lang="en-US" sz="1200"/>
-              <a:t> - city</a:t>
-            </a:r>
-            <a:endParaRPr lang="en-US" sz="1200"/>
-          </a:p>
-          <a:p>
-            <a:pPr marL="0" indent="0">
-              <a:buNone/>
-            </a:pPr>
-            <a:r>
-              <a:rPr lang="en-US" sz="1200"/>
-              <a:t> - population</a:t>
-            </a:r>
-            <a:endParaRPr lang="en-US" sz="1200"/>
-          </a:p>
-          <a:p>
-            <a:pPr marL="0" indent="0">
-              <a:buNone/>
-            </a:pPr>
-            <a:r>
-              <a:rPr lang="en-US" sz="1200"/>
-              <a:t> - area (m^2)</a:t>
-            </a:r>
-            <a:endParaRPr lang="en-US" sz="1200"/>
-          </a:p>
-          <a:p>
-            <a:pPr marL="0" indent="0">
-              <a:buNone/>
-            </a:pPr>
-            <a:r>
-              <a:rPr lang="en-US" sz="1200"/>
-              <a:t> + any relevant foreign keys</a:t>
-            </a:r>
-            <a:endParaRPr lang="en-US" sz="1200"/>
-          </a:p>
-        </p:txBody>
-      </p:sp>
-      <p:sp>
-        <p:nvSpPr>
-          <p:cNvPr id="6" name="Content Placeholder 5"/>
-          <p:cNvSpPr>
-            <a:spLocks noGrp="1"/>
-          </p:cNvSpPr>
-          <p:nvPr>
-            <p:ph sz="half" idx="2"/>
-          </p:nvPr>
-        </p:nvSpPr>
-        <p:spPr>
-          <a:xfrm>
-            <a:off x="6172200" y="922020"/>
-            <a:ext cx="5181600" cy="5255260"/>
-          </a:xfrm>
-        </p:spPr>
+            <p:ph idx="1"/>
+          </p:nvPr>
+        </p:nvSpPr>
+        <p:spPr/>
         <p:txBody>
           <a:bodyPr>
             <a:normAutofit fontScale="50000"/>
@@ -9025,10 +9099,8 @@
               <a:buNone/>
             </a:pPr>
             <a:r>
-              <a:rPr lang="en-US">
-                <a:sym typeface="+mn-ea"/>
-              </a:rPr>
-              <a:t> 3. House types</a:t>
+              <a:rPr lang="en-US"/>
+              <a:t>"""</a:t>
             </a:r>
             <a:endParaRPr lang="en-US"/>
           </a:p>
@@ -9037,10 +9109,8 @@
               <a:buNone/>
             </a:pPr>
             <a:r>
-              <a:rPr lang="en-US">
-                <a:sym typeface="+mn-ea"/>
-              </a:rPr>
-              <a:t> - id (incrementing integer starting at 1)</a:t>
+              <a:rPr lang="en-US"/>
+              <a:t>  I am creating input output training pairs to fine tune my gpt model. The usecase is a retailer generating a description for a product from a product catalogue. I want the input to be product name and category (to which the product belongs to) and output to be description.</a:t>
             </a:r>
             <a:endParaRPr lang="en-US"/>
           </a:p>
@@ -9049,10 +9119,8 @@
               <a:buNone/>
             </a:pPr>
             <a:r>
-              <a:rPr lang="en-US">
-                <a:sym typeface="+mn-ea"/>
-              </a:rPr>
-              <a:t> - house type</a:t>
+              <a:rPr lang="en-US"/>
+              <a:t>  The format should be of the form:</a:t>
             </a:r>
             <a:endParaRPr lang="en-US"/>
           </a:p>
@@ -9061,10 +9129,8 @@
               <a:buNone/>
             </a:pPr>
             <a:r>
-              <a:rPr lang="en-US">
-                <a:sym typeface="+mn-ea"/>
-              </a:rPr>
-              <a:t> - average house type price</a:t>
+              <a:rPr lang="en-US"/>
+              <a:t>  1.</a:t>
             </a:r>
             <a:endParaRPr lang="en-US"/>
           </a:p>
@@ -9073,10 +9139,8 @@
               <a:buNone/>
             </a:pPr>
             <a:r>
-              <a:rPr lang="en-US">
-                <a:sym typeface="+mn-ea"/>
-              </a:rPr>
-              <a:t> - number of houses</a:t>
+              <a:rPr lang="en-US"/>
+              <a:t>  Input: product_name, category</a:t>
             </a:r>
             <a:endParaRPr lang="en-US"/>
           </a:p>
@@ -9085,10 +9149,8 @@
               <a:buNone/>
             </a:pPr>
             <a:r>
-              <a:rPr lang="en-US">
-                <a:sym typeface="+mn-ea"/>
-              </a:rPr>
-              <a:t> + any relevant foreign keys</a:t>
+              <a:rPr lang="en-US"/>
+              <a:t>  Output: description</a:t>
             </a:r>
             <a:endParaRPr lang="en-US"/>
           </a:p>
@@ -9096,6 +9158,10 @@
             <a:pPr marL="0" indent="0">
               <a:buNone/>
             </a:pPr>
+            <a:r>
+              <a:rPr lang="en-US"/>
+              <a:t>  2.</a:t>
+            </a:r>
             <a:endParaRPr lang="en-US"/>
           </a:p>
           <a:p>
@@ -9103,10 +9169,8 @@
               <a:buNone/>
             </a:pPr>
             <a:r>
-              <a:rPr lang="en-US">
-                <a:sym typeface="+mn-ea"/>
-              </a:rPr>
-              <a:t>Make sure that the numbers make sense (i.e. more rooms is usually bigger size, more expensive locations increase price. more size is usually higher price etc. make sure all the numbers make sense).</a:t>
+              <a:rPr lang="en-US"/>
+              <a:t>  Input: product_name, category</a:t>
             </a:r>
             <a:endParaRPr lang="en-US"/>
           </a:p>
@@ -9115,10 +9179,8 @@
               <a:buNone/>
             </a:pPr>
             <a:r>
-              <a:rPr lang="en-US">
-                <a:sym typeface="+mn-ea"/>
-              </a:rPr>
-              <a:t>Make sure that the dataframe generally follow common sense checks, e.g. the size of the dataframes make sense in comparison with one another.</a:t>
+              <a:rPr lang="en-US"/>
+              <a:t>  Output: description</a:t>
             </a:r>
             <a:endParaRPr lang="en-US"/>
           </a:p>
@@ -9126,12 +9188,6 @@
             <a:pPr marL="0" indent="0">
               <a:buNone/>
             </a:pPr>
-            <a:r>
-              <a:rPr lang="en-US">
-                <a:sym typeface="+mn-ea"/>
-              </a:rPr>
-              <a:t>Make sure the foreign keys match up and you can use previously generated dataframes when creating each consecutive dataframes.</a:t>
-            </a:r>
             <a:endParaRPr lang="en-US"/>
           </a:p>
           <a:p>
@@ -9139,10 +9195,8 @@
               <a:buNone/>
             </a:pPr>
             <a:r>
-              <a:rPr lang="en-US">
-                <a:sym typeface="+mn-ea"/>
-              </a:rPr>
-              <a:t>You can use the previously generated dataframe to generate the next dataframe.</a:t>
+              <a:rPr lang="en-US"/>
+              <a:t>  Do not add any extra characters around that formatting as it will make the output parsing break.</a:t>
             </a:r>
             <a:endParaRPr lang="en-US"/>
           </a:p>
@@ -9151,10 +9205,8 @@
               <a:buNone/>
             </a:pPr>
             <a:r>
-              <a:rPr lang="en-US">
-                <a:sym typeface="+mn-ea"/>
-              </a:rPr>
-              <a:t>"""</a:t>
+              <a:rPr lang="en-US"/>
+              <a:t>  Create as many training pairs as possible.</a:t>
             </a:r>
             <a:endParaRPr lang="en-US"/>
           </a:p>
@@ -9162,6 +9214,10 @@
             <a:pPr marL="0" indent="0">
               <a:buNone/>
             </a:pPr>
+            <a:r>
+              <a:rPr lang="en-US"/>
+              <a:t>  """</a:t>
+            </a:r>
             <a:endParaRPr lang="en-US"/>
           </a:p>
         </p:txBody>
@@ -9200,15 +9256,15 @@
           <a:p>
             <a:r>
               <a:rPr lang="en-US"/>
-              <a:t>creating textual data</a:t>
-            </a:r>
-            <a:endParaRPr lang="en-US"/>
-          </a:p>
-        </p:txBody>
-      </p:sp>
-      <p:sp>
-        <p:nvSpPr>
-          <p:cNvPr id="5" name="Content Placeholder 4"/>
+              <a:t>result </a:t>
+            </a:r>
+            <a:endParaRPr lang="en-US"/>
+          </a:p>
+        </p:txBody>
+      </p:sp>
+      <p:sp>
+        <p:nvSpPr>
+          <p:cNvPr id="3" name="Content Placeholder 2"/>
           <p:cNvSpPr>
             <a:spLocks noGrp="1"/>
           </p:cNvSpPr>
@@ -9219,133 +9275,157 @@
         <p:spPr/>
         <p:txBody>
           <a:bodyPr>
-            <a:normAutofit fontScale="50000"/>
+            <a:noAutofit/>
           </a:bodyPr>
           <a:p>
             <a:pPr marL="0" indent="0">
               <a:buNone/>
             </a:pPr>
             <a:r>
-              <a:rPr lang="en-US"/>
-              <a:t>"""</a:t>
-            </a:r>
-            <a:endParaRPr lang="en-US"/>
+              <a:rPr lang="en-US" sz="1200"/>
+              <a:t>1.</a:t>
+            </a:r>
+            <a:endParaRPr lang="en-US" sz="1200"/>
           </a:p>
           <a:p>
             <a:pPr marL="0" indent="0">
               <a:buNone/>
             </a:pPr>
             <a:r>
-              <a:rPr lang="en-US"/>
-              <a:t>  I am creating input output training pairs to fine tune my gpt model. The usecase is a retailer generating a description for a product from a product catalogue. I want the input to be product name and category (to which the product belongs to) and output to be description.</a:t>
-            </a:r>
-            <a:endParaRPr lang="en-US"/>
+              <a:rPr lang="en-US" sz="1200"/>
+              <a:t>Input: Wireless Bluetooth Headphones, Electronics</a:t>
+            </a:r>
+            <a:endParaRPr lang="en-US" sz="1200"/>
           </a:p>
           <a:p>
             <a:pPr marL="0" indent="0">
               <a:buNone/>
             </a:pPr>
             <a:r>
-              <a:rPr lang="en-US"/>
-              <a:t>  The format should be of the form:</a:t>
-            </a:r>
-            <a:endParaRPr lang="en-US"/>
+              <a:rPr lang="en-US" sz="1200"/>
+              <a:t>Output: Immerse yourself in high-quality sound with these Wireless Bluetooth Headphones, featuring active noise cancellation and a comfortable over-ear design for extended listening sessions.</a:t>
+            </a:r>
+            <a:endParaRPr lang="en-US" sz="1200"/>
           </a:p>
           <a:p>
             <a:pPr marL="0" indent="0">
               <a:buNone/>
             </a:pPr>
             <a:r>
-              <a:rPr lang="en-US"/>
-              <a:t>  1.</a:t>
-            </a:r>
-            <a:endParaRPr lang="en-US"/>
+              <a:rPr lang="en-US" sz="1200"/>
+              <a:t>2.</a:t>
+            </a:r>
+            <a:endParaRPr lang="en-US" sz="1200"/>
           </a:p>
           <a:p>
             <a:pPr marL="0" indent="0">
               <a:buNone/>
             </a:pPr>
             <a:r>
-              <a:rPr lang="en-US"/>
-              <a:t>  Input: product_name, category</a:t>
-            </a:r>
-            <a:endParaRPr lang="en-US"/>
+              <a:rPr lang="en-US" sz="1200"/>
+              <a:t>Input: Organic Green Tea, Beverages</a:t>
+            </a:r>
+            <a:endParaRPr lang="en-US" sz="1200"/>
           </a:p>
           <a:p>
             <a:pPr marL="0" indent="0">
               <a:buNone/>
             </a:pPr>
             <a:r>
-              <a:rPr lang="en-US"/>
-              <a:t>  Output: description</a:t>
-            </a:r>
-            <a:endParaRPr lang="en-US"/>
+              <a:rPr lang="en-US" sz="1200"/>
+              <a:t>Output: Enjoy a refreshing cup of Organic Green Tea, sourced from the finest leaves, packed with antioxidants, and perfect for a healthy, invigorating boost anytime.</a:t>
+            </a:r>
+            <a:endParaRPr lang="en-US" sz="1200"/>
           </a:p>
           <a:p>
             <a:pPr marL="0" indent="0">
               <a:buNone/>
             </a:pPr>
             <a:r>
-              <a:rPr lang="en-US"/>
-              <a:t>  2.</a:t>
-            </a:r>
-            <a:endParaRPr lang="en-US"/>
+              <a:rPr lang="en-US" sz="1200"/>
+              <a:t>3.</a:t>
+            </a:r>
+            <a:endParaRPr lang="en-US" sz="1200"/>
           </a:p>
           <a:p>
             <a:pPr marL="0" indent="0">
               <a:buNone/>
             </a:pPr>
             <a:r>
-              <a:rPr lang="en-US"/>
-              <a:t>  Input: product_name, category</a:t>
-            </a:r>
-            <a:endParaRPr lang="en-US"/>
+              <a:rPr lang="en-US" sz="1200"/>
+              <a:t>Input: Stainless Steel Kitchen Knife, Kitchenware</a:t>
+            </a:r>
+            <a:endParaRPr lang="en-US" sz="1200"/>
           </a:p>
           <a:p>
             <a:pPr marL="0" indent="0">
               <a:buNone/>
             </a:pPr>
             <a:r>
-              <a:rPr lang="en-US"/>
-              <a:t>  Output: description</a:t>
-            </a:r>
-            <a:endParaRPr lang="en-US"/>
+              <a:rPr lang="en-US" sz="1200"/>
+              <a:t>Output: Cut with precision and ease using this Stainless Steel Kitchen Knife, designed with an ergonomic handle and a sharp blade for all your culinary tasks.</a:t>
+            </a:r>
+            <a:endParaRPr lang="en-US" sz="1200"/>
           </a:p>
           <a:p>
             <a:pPr marL="0" indent="0">
               <a:buNone/>
             </a:pPr>
-            <a:endParaRPr lang="en-US"/>
+            <a:r>
+              <a:rPr lang="en-US" sz="1200"/>
+              <a:t>4.</a:t>
+            </a:r>
+            <a:endParaRPr lang="en-US" sz="1200"/>
           </a:p>
           <a:p>
             <a:pPr marL="0" indent="0">
               <a:buNone/>
             </a:pPr>
             <a:r>
-              <a:rPr lang="en-US"/>
-              <a:t>  Do not add any extra characters around that formatting as it will make the output parsing break.</a:t>
-            </a:r>
-            <a:endParaRPr lang="en-US"/>
+              <a:rPr lang="en-US" sz="1200"/>
+              <a:t>Input: Hiking Backpack, Outdoor Gear</a:t>
+            </a:r>
+            <a:endParaRPr lang="en-US" sz="1200"/>
           </a:p>
           <a:p>
             <a:pPr marL="0" indent="0">
               <a:buNone/>
             </a:pPr>
             <a:r>
-              <a:rPr lang="en-US"/>
-              <a:t>  Create as many training pairs as possible.</a:t>
-            </a:r>
-            <a:endParaRPr lang="en-US"/>
+              <a:rPr lang="en-US" sz="1200"/>
+              <a:t>Output: Explore the great outdoors with this durable Hiking Backpack, featuring multiple compartments for optimal organization and a breathable design for ultimate comfort on long treks.</a:t>
+            </a:r>
+            <a:endParaRPr lang="en-US" sz="1200"/>
           </a:p>
           <a:p>
             <a:pPr marL="0" indent="0">
               <a:buNone/>
             </a:pPr>
             <a:r>
-              <a:rPr lang="en-US"/>
-              <a:t>  """</a:t>
-            </a:r>
-            <a:endParaRPr lang="en-US"/>
+              <a:rPr lang="en-US" sz="1200"/>
+              <a:t>5.</a:t>
+            </a:r>
+            <a:endParaRPr lang="en-US" sz="1200"/>
+          </a:p>
+          <a:p>
+            <a:pPr marL="0" indent="0">
+              <a:buNone/>
+            </a:pPr>
+            <a:r>
+              <a:rPr lang="en-US" sz="1200"/>
+              <a:t>Input: Air Fryer, Kitchen Appliances</a:t>
+            </a:r>
+            <a:endParaRPr lang="en-US" sz="1200"/>
+          </a:p>
+          <a:p>
+            <a:pPr marL="0" indent="0">
+              <a:buNone/>
+            </a:pPr>
+            <a:r>
+              <a:rPr lang="en-US" sz="1200"/>
+              <a:t>Output: Cook your favorite meals with less oil using this Air Fryer</a:t>
+            </a:r>
+            <a:endParaRPr lang="en-US" sz="1200"/>
           </a:p>
         </p:txBody>
       </p:sp>
@@ -9383,7 +9463,7 @@
           <a:p>
             <a:r>
               <a:rPr lang="en-US"/>
-              <a:t>result </a:t>
+              <a:t>Tools </a:t>
             </a:r>
             <a:endParaRPr lang="en-US"/>
           </a:p>
@@ -9401,158 +9481,34 @@
         </p:nvSpPr>
         <p:spPr/>
         <p:txBody>
-          <a:bodyPr>
-            <a:noAutofit/>
-          </a:bodyPr>
-          <a:p>
-            <a:pPr marL="0" indent="0">
-              <a:buNone/>
-            </a:pPr>
-            <a:r>
-              <a:rPr lang="en-US" sz="1200"/>
-              <a:t>1.</a:t>
-            </a:r>
-            <a:endParaRPr lang="en-US" sz="1200"/>
-          </a:p>
-          <a:p>
-            <a:pPr marL="0" indent="0">
-              <a:buNone/>
-            </a:pPr>
-            <a:r>
-              <a:rPr lang="en-US" sz="1200"/>
-              <a:t>Input: Wireless Bluetooth Headphones, Electronics</a:t>
-            </a:r>
-            <a:endParaRPr lang="en-US" sz="1200"/>
-          </a:p>
-          <a:p>
-            <a:pPr marL="0" indent="0">
-              <a:buNone/>
-            </a:pPr>
-            <a:r>
-              <a:rPr lang="en-US" sz="1200"/>
-              <a:t>Output: Immerse yourself in high-quality sound with these Wireless Bluetooth Headphones, featuring active noise cancellation and a comfortable over-ear design for extended listening sessions.</a:t>
-            </a:r>
-            <a:endParaRPr lang="en-US" sz="1200"/>
-          </a:p>
-          <a:p>
-            <a:pPr marL="0" indent="0">
-              <a:buNone/>
-            </a:pPr>
-            <a:r>
-              <a:rPr lang="en-US" sz="1200"/>
-              <a:t>2.</a:t>
-            </a:r>
-            <a:endParaRPr lang="en-US" sz="1200"/>
-          </a:p>
-          <a:p>
-            <a:pPr marL="0" indent="0">
-              <a:buNone/>
-            </a:pPr>
-            <a:r>
-              <a:rPr lang="en-US" sz="1200"/>
-              <a:t>Input: Organic Green Tea, Beverages</a:t>
-            </a:r>
-            <a:endParaRPr lang="en-US" sz="1200"/>
-          </a:p>
-          <a:p>
-            <a:pPr marL="0" indent="0">
-              <a:buNone/>
-            </a:pPr>
-            <a:r>
-              <a:rPr lang="en-US" sz="1200"/>
-              <a:t>Output: Enjoy a refreshing cup of Organic Green Tea, sourced from the finest leaves, packed with antioxidants, and perfect for a healthy, invigorating boost anytime.</a:t>
-            </a:r>
-            <a:endParaRPr lang="en-US" sz="1200"/>
-          </a:p>
-          <a:p>
-            <a:pPr marL="0" indent="0">
-              <a:buNone/>
-            </a:pPr>
-            <a:r>
-              <a:rPr lang="en-US" sz="1200"/>
-              <a:t>3.</a:t>
-            </a:r>
-            <a:endParaRPr lang="en-US" sz="1200"/>
-          </a:p>
-          <a:p>
-            <a:pPr marL="0" indent="0">
-              <a:buNone/>
-            </a:pPr>
-            <a:r>
-              <a:rPr lang="en-US" sz="1200"/>
-              <a:t>Input: Stainless Steel Kitchen Knife, Kitchenware</a:t>
-            </a:r>
-            <a:endParaRPr lang="en-US" sz="1200"/>
-          </a:p>
-          <a:p>
-            <a:pPr marL="0" indent="0">
-              <a:buNone/>
-            </a:pPr>
-            <a:r>
-              <a:rPr lang="en-US" sz="1200"/>
-              <a:t>Output: Cut with precision and ease using this Stainless Steel Kitchen Knife, designed with an ergonomic handle and a sharp blade for all your culinary tasks.</a:t>
-            </a:r>
-            <a:endParaRPr lang="en-US" sz="1200"/>
-          </a:p>
-          <a:p>
-            <a:pPr marL="0" indent="0">
-              <a:buNone/>
-            </a:pPr>
-            <a:r>
-              <a:rPr lang="en-US" sz="1200"/>
-              <a:t>4.</a:t>
-            </a:r>
-            <a:endParaRPr lang="en-US" sz="1200"/>
-          </a:p>
-          <a:p>
-            <a:pPr marL="0" indent="0">
-              <a:buNone/>
-            </a:pPr>
-            <a:r>
-              <a:rPr lang="en-US" sz="1200"/>
-              <a:t>Input: Hiking Backpack, Outdoor Gear</a:t>
-            </a:r>
-            <a:endParaRPr lang="en-US" sz="1200"/>
-          </a:p>
-          <a:p>
-            <a:pPr marL="0" indent="0">
-              <a:buNone/>
-            </a:pPr>
-            <a:r>
-              <a:rPr lang="en-US" sz="1200"/>
-              <a:t>Output: Explore the great outdoors with this durable Hiking Backpack, featuring multiple compartments for optimal organization and a breathable design for ultimate comfort on long treks.</a:t>
-            </a:r>
-            <a:endParaRPr lang="en-US" sz="1200"/>
-          </a:p>
-          <a:p>
-            <a:pPr marL="0" indent="0">
-              <a:buNone/>
-            </a:pPr>
-            <a:r>
-              <a:rPr lang="en-US" sz="1200"/>
-              <a:t>5.</a:t>
-            </a:r>
-            <a:endParaRPr lang="en-US" sz="1200"/>
-          </a:p>
-          <a:p>
-            <a:pPr marL="0" indent="0">
-              <a:buNone/>
-            </a:pPr>
-            <a:r>
-              <a:rPr lang="en-US" sz="1200"/>
-              <a:t>Input: Air Fryer, Kitchen Appliances</a:t>
-            </a:r>
-            <a:endParaRPr lang="en-US" sz="1200"/>
-          </a:p>
-          <a:p>
-            <a:pPr marL="0" indent="0">
-              <a:buNone/>
-            </a:pPr>
-            <a:r>
-              <a:rPr lang="en-US" sz="1200"/>
-              <a:t>Output: Cook your favorite meals with less oil using this Air Fryer</a:t>
-            </a:r>
-            <a:endParaRPr lang="en-US" sz="1200"/>
+          <a:bodyPr/>
+          <a:p>
+            <a:r>
+              <a:rPr lang="en-US"/>
+              <a:t>https://gretel.ai</a:t>
+            </a:r>
+            <a:endParaRPr lang="en-US"/>
+          </a:p>
+          <a:p>
+            <a:r>
+              <a:rPr lang="en-US"/>
+              <a:t>https://www.tonic.ai/</a:t>
+            </a:r>
+            <a:endParaRPr lang="en-US"/>
+          </a:p>
+          <a:p>
+            <a:r>
+              <a:rPr lang="en-US"/>
+              <a:t>https://synthetichealth.github.io/synthea/</a:t>
+            </a:r>
+            <a:endParaRPr lang="en-US"/>
+          </a:p>
+          <a:p>
+            <a:r>
+              <a:rPr lang="en-US"/>
+              <a:t>https://fakerjs.dev/</a:t>
+            </a:r>
+            <a:endParaRPr lang="en-US"/>
           </a:p>
         </p:txBody>
       </p:sp>
@@ -9565,89 +9521,6 @@
 </file>
 
 <file path=ppt/slides/slide25.xml><?xml version="1.0" encoding="utf-8"?>
-<p:sld xmlns:a="http://schemas.openxmlformats.org/drawingml/2006/main" xmlns:r="http://schemas.openxmlformats.org/officeDocument/2006/relationships" xmlns:p="http://schemas.openxmlformats.org/presentationml/2006/main">
-  <p:cSld>
-    <p:spTree>
-      <p:nvGrpSpPr>
-        <p:cNvPr id="1" name=""/>
-        <p:cNvGrpSpPr/>
-        <p:nvPr/>
-      </p:nvGrpSpPr>
-      <p:grpSpPr/>
-      <p:sp>
-        <p:nvSpPr>
-          <p:cNvPr id="2" name="Title 1"/>
-          <p:cNvSpPr>
-            <a:spLocks noGrp="1"/>
-          </p:cNvSpPr>
-          <p:nvPr>
-            <p:ph type="title"/>
-          </p:nvPr>
-        </p:nvSpPr>
-        <p:spPr/>
-        <p:txBody>
-          <a:bodyPr/>
-          <a:p>
-            <a:r>
-              <a:rPr lang="en-US"/>
-              <a:t>Tools </a:t>
-            </a:r>
-            <a:endParaRPr lang="en-US"/>
-          </a:p>
-        </p:txBody>
-      </p:sp>
-      <p:sp>
-        <p:nvSpPr>
-          <p:cNvPr id="3" name="Content Placeholder 2"/>
-          <p:cNvSpPr>
-            <a:spLocks noGrp="1"/>
-          </p:cNvSpPr>
-          <p:nvPr>
-            <p:ph idx="1"/>
-          </p:nvPr>
-        </p:nvSpPr>
-        <p:spPr/>
-        <p:txBody>
-          <a:bodyPr/>
-          <a:p>
-            <a:r>
-              <a:rPr lang="en-US"/>
-              <a:t>https://gretel.ai</a:t>
-            </a:r>
-            <a:endParaRPr lang="en-US"/>
-          </a:p>
-          <a:p>
-            <a:r>
-              <a:rPr lang="en-US"/>
-              <a:t>https://www.tonic.ai/</a:t>
-            </a:r>
-            <a:endParaRPr lang="en-US"/>
-          </a:p>
-          <a:p>
-            <a:r>
-              <a:rPr lang="en-US"/>
-              <a:t>https://synthetichealth.github.io/synthea/</a:t>
-            </a:r>
-            <a:endParaRPr lang="en-US"/>
-          </a:p>
-          <a:p>
-            <a:r>
-              <a:rPr lang="en-US"/>
-              <a:t>https://fakerjs.dev/</a:t>
-            </a:r>
-            <a:endParaRPr lang="en-US"/>
-          </a:p>
-        </p:txBody>
-      </p:sp>
-    </p:spTree>
-  </p:cSld>
-  <p:clrMapOvr>
-    <a:masterClrMapping/>
-  </p:clrMapOvr>
-</p:sld>
-</file>
-
-<file path=ppt/slides/slide26.xml><?xml version="1.0" encoding="utf-8"?>
 <p:sld xmlns:a="http://schemas.openxmlformats.org/drawingml/2006/main" xmlns:r="http://schemas.openxmlformats.org/officeDocument/2006/relationships" xmlns:p="http://schemas.openxmlformats.org/presentationml/2006/main">
   <p:cSld>
     <p:spTree>
@@ -9878,29 +9751,45 @@
           <a:bodyPr/>
           <a:p>
             <a:r>
+              <a:rPr lang="en-US" b="1"/>
+              <a:t>No More Data Shortages</a:t>
+            </a:r>
+            <a:r>
               <a:rPr lang="en-US"/>
-              <a:t>No More Data Shortages: When real-world data is scarce or expensive (e.g., rare medical conditions or customer behavior for a new product), synthetic data fills the gap.</a:t>
-            </a:r>
-            <a:endParaRPr lang="en-US"/>
-          </a:p>
-          <a:p>
+              <a:t>: When real-world data is scarce or expensive (e.g., rare medical conditions or customer behavior for a new product), synthetic data fills the gap.</a:t>
+            </a:r>
+            <a:endParaRPr lang="en-US"/>
+          </a:p>
+          <a:p>
+            <a:r>
+              <a:rPr lang="en-US" b="1"/>
+              <a:t>Privacy Protection</a:t>
+            </a:r>
             <a:r>
               <a:rPr lang="en-US"/>
-              <a:t>Privacy Protection: Using sensitive personal information can raise ethical concerns. Synthetic data allows AI training without compromising privacy.</a:t>
-            </a:r>
-            <a:endParaRPr lang="en-US"/>
-          </a:p>
-          <a:p>
+              <a:t>: Using sensitive personal information can raise ethical concerns. Synthetic data allows AI training without compromising privacy.</a:t>
+            </a:r>
+            <a:endParaRPr lang="en-US"/>
+          </a:p>
+          <a:p>
+            <a:r>
+              <a:rPr lang="en-US" b="1"/>
+              <a:t>Bias Buster</a:t>
+            </a:r>
             <a:r>
               <a:rPr lang="en-US"/>
-              <a:t>Bias Buster: Real-world data often contains biases. Synthetic data helps create balanced datasets, providing a fairer view for AI models.</a:t>
-            </a:r>
-            <a:endParaRPr lang="en-US"/>
-          </a:p>
-          <a:p>
+              <a:t>: Real-world data often contains biases. Synthetic data helps create balanced datasets, providing a fairer view for AI models.</a:t>
+            </a:r>
+            <a:endParaRPr lang="en-US"/>
+          </a:p>
+          <a:p>
+            <a:r>
+              <a:rPr lang="en-US" b="1"/>
+              <a:t>The “What-If” Trainer</a:t>
+            </a:r>
             <a:r>
               <a:rPr lang="en-US"/>
-              <a:t>The “What-If” Trainer: Synthetic data lets you explore rare events and edge cases, preparing your AI for unpredictable situations.</a:t>
+              <a:t>: Synthetic data lets you explore rare events and edge cases, preparing your AI for unpredictable situations.</a:t>
             </a:r>
             <a:endParaRPr lang="en-US"/>
           </a:p>
@@ -9939,8 +9828,10 @@
           <a:bodyPr/>
           <a:p>
             <a:r>
-              <a:rPr lang="en-US"/>
-              <a:t>Applications </a:t>
+              <a:rPr lang="en-US">
+                <a:sym typeface="+mn-ea"/>
+              </a:rPr>
+              <a:t>Why is Synthetic Data is needed?</a:t>
             </a:r>
             <a:endParaRPr lang="en-US"/>
           </a:p>
@@ -10009,98 +9900,6 @@
 </file>
 
 <file path=ppt/slides/slide6.xml><?xml version="1.0" encoding="utf-8"?>
-<p:sld xmlns:a="http://schemas.openxmlformats.org/drawingml/2006/main" xmlns:r="http://schemas.openxmlformats.org/officeDocument/2006/relationships" xmlns:p="http://schemas.openxmlformats.org/presentationml/2006/main">
-  <p:cSld>
-    <p:spTree>
-      <p:nvGrpSpPr>
-        <p:cNvPr id="1" name=""/>
-        <p:cNvGrpSpPr/>
-        <p:nvPr/>
-      </p:nvGrpSpPr>
-      <p:grpSpPr/>
-      <p:sp>
-        <p:nvSpPr>
-          <p:cNvPr id="2" name="Title 1"/>
-          <p:cNvSpPr>
-            <a:spLocks noGrp="1"/>
-          </p:cNvSpPr>
-          <p:nvPr>
-            <p:ph type="title"/>
-          </p:nvPr>
-        </p:nvSpPr>
-        <p:spPr/>
-        <p:txBody>
-          <a:bodyPr/>
-          <a:p>
-            <a:r>
-              <a:rPr lang="en-US">
-                <a:sym typeface="+mn-ea"/>
-              </a:rPr>
-              <a:t>Applications </a:t>
-            </a:r>
-            <a:endParaRPr lang="en-US"/>
-          </a:p>
-        </p:txBody>
-      </p:sp>
-      <p:sp>
-        <p:nvSpPr>
-          <p:cNvPr id="3" name="Content Placeholder 2"/>
-          <p:cNvSpPr>
-            <a:spLocks noGrp="1"/>
-          </p:cNvSpPr>
-          <p:nvPr>
-            <p:ph idx="1"/>
-          </p:nvPr>
-        </p:nvSpPr>
-        <p:spPr/>
-        <p:txBody>
-          <a:bodyPr/>
-          <a:p>
-            <a:r>
-              <a:rPr lang="en-US"/>
-              <a:t>Benchmarking Algorithms and Tools: </a:t>
-            </a:r>
-            <a:endParaRPr lang="en-US"/>
-          </a:p>
-          <a:p>
-            <a:pPr lvl="1"/>
-            <a:r>
-              <a:rPr lang="en-US"/>
-              <a:t>Synthetic data provides a controlled environment for evaluating algorithms, libraries, and tools. Researchers can compare performance objectively.</a:t>
-            </a:r>
-            <a:endParaRPr lang="en-US"/>
-          </a:p>
-          <a:p>
-            <a:pPr lvl="1"/>
-            <a:r>
-              <a:rPr lang="en-US"/>
-              <a:t>For example, testing database indexing strategies or evaluating compression techniques.</a:t>
-            </a:r>
-            <a:endParaRPr lang="en-US"/>
-          </a:p>
-          <a:p>
-            <a:pPr lvl="0"/>
-            <a:r>
-              <a:rPr lang="en-US"/>
-              <a:t>To make an idea about a real dataset before collecting it </a:t>
-            </a:r>
-            <a:endParaRPr lang="en-US"/>
-          </a:p>
-          <a:p>
-            <a:pPr lvl="1"/>
-            <a:endParaRPr lang="en-US"/>
-          </a:p>
-        </p:txBody>
-      </p:sp>
-    </p:spTree>
-  </p:cSld>
-  <p:clrMapOvr>
-    <a:masterClrMapping/>
-  </p:clrMapOvr>
-</p:sld>
-</file>
-
-<file path=ppt/slides/slide7.xml><?xml version="1.0" encoding="utf-8"?>
 <p:sld xmlns:a="http://schemas.openxmlformats.org/drawingml/2006/main" xmlns:r="http://schemas.openxmlformats.org/officeDocument/2006/relationships" xmlns:p="http://schemas.openxmlformats.org/presentationml/2006/main">
   <p:cSld>
     <p:spTree>
@@ -10234,6 +10033,100 @@
 </p:sld>
 </file>
 
+<file path=ppt/slides/slide7.xml><?xml version="1.0" encoding="utf-8"?>
+<p:sld xmlns:a="http://schemas.openxmlformats.org/drawingml/2006/main" xmlns:r="http://schemas.openxmlformats.org/officeDocument/2006/relationships" xmlns:p="http://schemas.openxmlformats.org/presentationml/2006/main">
+  <p:cSld>
+    <p:spTree>
+      <p:nvGrpSpPr>
+        <p:cNvPr id="1" name=""/>
+        <p:cNvGrpSpPr/>
+        <p:nvPr/>
+      </p:nvGrpSpPr>
+      <p:grpSpPr/>
+      <p:sp>
+        <p:nvSpPr>
+          <p:cNvPr id="2" name="Title 1"/>
+          <p:cNvSpPr>
+            <a:spLocks noGrp="1"/>
+          </p:cNvSpPr>
+          <p:nvPr>
+            <p:ph type="title"/>
+          </p:nvPr>
+        </p:nvSpPr>
+        <p:spPr/>
+        <p:txBody>
+          <a:bodyPr/>
+          <a:p>
+            <a:r>
+              <a:rPr lang="en-US"/>
+              <a:t>Methods to create </a:t>
+            </a:r>
+            <a:r>
+              <a:rPr lang="en-US">
+                <a:sym typeface="+mn-ea"/>
+              </a:rPr>
+              <a:t>Synthetic Data </a:t>
+            </a:r>
+            <a:endParaRPr lang="en-US"/>
+          </a:p>
+        </p:txBody>
+      </p:sp>
+      <p:sp>
+        <p:nvSpPr>
+          <p:cNvPr id="3" name="Content Placeholder 2"/>
+          <p:cNvSpPr>
+            <a:spLocks noGrp="1"/>
+          </p:cNvSpPr>
+          <p:nvPr>
+            <p:ph idx="1"/>
+          </p:nvPr>
+        </p:nvSpPr>
+        <p:spPr/>
+        <p:txBody>
+          <a:bodyPr>
+            <a:normAutofit/>
+          </a:bodyPr>
+          <a:p>
+            <a:r>
+              <a:rPr lang="en-US"/>
+              <a:t>Procedural Methods:</a:t>
+            </a:r>
+            <a:endParaRPr lang="en-US"/>
+          </a:p>
+          <a:p>
+            <a:pPr lvl="1"/>
+            <a:r>
+              <a:rPr lang="en-US"/>
+              <a:t>Think of these as following a recipe for data creation.</a:t>
+            </a:r>
+            <a:endParaRPr lang="en-US"/>
+          </a:p>
+          <a:p>
+            <a:pPr lvl="1"/>
+            <a:r>
+              <a:rPr lang="en-US"/>
+              <a:t>Procedural methods are great for structured data like addresses or financial records.</a:t>
+            </a:r>
+            <a:endParaRPr lang="en-US"/>
+          </a:p>
+          <a:p>
+            <a:pPr lvl="1"/>
+            <a:r>
+              <a:rPr lang="en-US"/>
+              <a:t>They allow precise control over data characteristics.</a:t>
+            </a:r>
+            <a:endParaRPr lang="en-US"/>
+          </a:p>
+        </p:txBody>
+      </p:sp>
+    </p:spTree>
+  </p:cSld>
+  <p:clrMapOvr>
+    <a:masterClrMapping/>
+  </p:clrMapOvr>
+</p:sld>
+</file>
+
 <file path=ppt/slides/slide8.xml><?xml version="1.0" encoding="utf-8"?>
 <p:sld xmlns:a="http://schemas.openxmlformats.org/drawingml/2006/main" xmlns:r="http://schemas.openxmlformats.org/officeDocument/2006/relationships" xmlns:p="http://schemas.openxmlformats.org/presentationml/2006/main">
   <p:cSld>
@@ -10259,7 +10152,9 @@
           <a:bodyPr/>
           <a:p>
             <a:r>
-              <a:rPr lang="en-US"/>
+              <a:rPr lang="en-US">
+                <a:sym typeface="+mn-ea"/>
+              </a:rPr>
               <a:t>Methods to create </a:t>
             </a:r>
             <a:r>
@@ -10284,13 +10179,11 @@
         </p:nvSpPr>
         <p:spPr/>
         <p:txBody>
-          <a:bodyPr>
-            <a:normAutofit/>
-          </a:bodyPr>
+          <a:bodyPr/>
           <a:p>
             <a:r>
               <a:rPr lang="en-US"/>
-              <a:t>Procedural Methods:</a:t>
+              <a:t>imulation-Based Approaches:</a:t>
             </a:r>
             <a:endParaRPr lang="en-US"/>
           </a:p>
@@ -10298,7 +10191,7 @@
             <a:pPr lvl="1"/>
             <a:r>
               <a:rPr lang="en-US"/>
-              <a:t>Think of these as following a recipe for data creation.</a:t>
+              <a:t>Ideal for scenarios where physical rules matter.</a:t>
             </a:r>
             <a:endParaRPr lang="en-US"/>
           </a:p>
@@ -10306,7 +10199,7 @@
             <a:pPr lvl="1"/>
             <a:r>
               <a:rPr lang="en-US"/>
-              <a:t>Procedural methods are great for structured data like addresses or financial records.</a:t>
+              <a:t>For instance, training self-driving car AI involves simulating real-world events.</a:t>
             </a:r>
             <a:endParaRPr lang="en-US"/>
           </a:p>
@@ -10314,7 +10207,7 @@
             <a:pPr lvl="1"/>
             <a:r>
               <a:rPr lang="en-US"/>
-              <a:t>They allow precise control over data characteristics.</a:t>
+              <a:t>Simulation-based synthetic data ensures your AI understands complex environments</a:t>
             </a:r>
             <a:endParaRPr lang="en-US"/>
           </a:p>
@@ -10353,16 +10246,8 @@
           <a:bodyPr/>
           <a:p>
             <a:r>
-              <a:rPr lang="en-US">
-                <a:sym typeface="+mn-ea"/>
-              </a:rPr>
-              <a:t>Methods to create </a:t>
-            </a:r>
-            <a:r>
-              <a:rPr lang="en-US">
-                <a:sym typeface="+mn-ea"/>
-              </a:rPr>
-              <a:t>Synthetic Data </a:t>
+              <a:rPr lang="en-US"/>
+              <a:t>“Synthetic Data Cheat Sheet”</a:t>
             </a:r>
             <a:endParaRPr lang="en-US"/>
           </a:p>
@@ -10380,11 +10265,13 @@
         </p:nvSpPr>
         <p:spPr/>
         <p:txBody>
-          <a:bodyPr/>
+          <a:bodyPr>
+            <a:normAutofit fontScale="80000"/>
+          </a:bodyPr>
           <a:p>
             <a:r>
               <a:rPr lang="en-US"/>
-              <a:t>imulation-Based Approaches:</a:t>
+              <a:t>Generative Adversarial Networks (GANs):</a:t>
             </a:r>
             <a:endParaRPr lang="en-US"/>
           </a:p>
@@ -10392,7 +10279,7 @@
             <a:pPr lvl="1"/>
             <a:r>
               <a:rPr lang="en-US"/>
-              <a:t>Ideal for scenarios where physical rules matter.</a:t>
+              <a:t>Goal: Ultra-realistic visuals (e.g., medical images, fashion products, chatbot faces).</a:t>
             </a:r>
             <a:endParaRPr lang="en-US"/>
           </a:p>
@@ -10400,7 +10287,14 @@
             <a:pPr lvl="1"/>
             <a:r>
               <a:rPr lang="en-US"/>
-              <a:t>For instance, training self-driving car AI involves simulating real-world events.</a:t>
+              <a:t>Real-World Case: Researchers used GANs for synthetic brain scans, aiding disease detection while protecting privacy.</a:t>
+            </a:r>
+            <a:endParaRPr lang="en-US"/>
+          </a:p>
+          <a:p>
+            <a:r>
+              <a:rPr lang="en-US"/>
+              <a:t>Procedural Generation:</a:t>
             </a:r>
             <a:endParaRPr lang="en-US"/>
           </a:p>
@@ -10408,7 +10302,38 @@
             <a:pPr lvl="1"/>
             <a:r>
               <a:rPr lang="en-US"/>
-              <a:t>Simulation-based synthetic data ensures your AI understands complex environments</a:t>
+              <a:t>Goal: Large sets of structured data (customer records, financial transactions, website logs).</a:t>
+            </a:r>
+            <a:endParaRPr lang="en-US"/>
+          </a:p>
+          <a:p>
+            <a:pPr lvl="1"/>
+            <a:r>
+              <a:rPr lang="en-US"/>
+              <a:t>Real-World Case: E-commerce companies test website layout changes using procedural generation.</a:t>
+            </a:r>
+            <a:endParaRPr lang="en-US"/>
+          </a:p>
+          <a:p>
+            <a:r>
+              <a:rPr lang="en-US"/>
+              <a:t>Simulation-Based:</a:t>
+            </a:r>
+            <a:endParaRPr lang="en-US"/>
+          </a:p>
+          <a:p>
+            <a:pPr lvl="1"/>
+            <a:r>
+              <a:rPr lang="en-US"/>
+              <a:t>Goal: AI that reacts to a physics-based world (robotics, self-driving cars, game development).</a:t>
+            </a:r>
+            <a:endParaRPr lang="en-US"/>
+          </a:p>
+          <a:p>
+            <a:pPr lvl="1"/>
+            <a:r>
+              <a:rPr lang="en-US"/>
+              <a:t>Real-World Case: Self-driving car companies train AI in hyper-realistic simulations.</a:t>
             </a:r>
             <a:endParaRPr lang="en-US"/>
           </a:p>

</xml_diff>